<commit_message>
kondisi dan fungsi pada python
</commit_message>
<xml_diff>
--- a/materi python.pptx
+++ b/materi python.pptx
@@ -5,7 +5,7 @@
     <p:sldMasterId id="2147483648" r:id="rId1"/>
   </p:sldMasterIdLst>
   <p:notesMasterIdLst>
-    <p:notesMasterId r:id="rId27"/>
+    <p:notesMasterId r:id="rId28"/>
   </p:notesMasterIdLst>
   <p:sldIdLst>
     <p:sldId id="256" r:id="rId2"/>
@@ -30,9 +30,10 @@
     <p:sldId id="278" r:id="rId21"/>
     <p:sldId id="279" r:id="rId22"/>
     <p:sldId id="280" r:id="rId23"/>
-    <p:sldId id="262" r:id="rId24"/>
-    <p:sldId id="263" r:id="rId25"/>
-    <p:sldId id="264" r:id="rId26"/>
+    <p:sldId id="281" r:id="rId24"/>
+    <p:sldId id="262" r:id="rId25"/>
+    <p:sldId id="263" r:id="rId26"/>
+    <p:sldId id="264" r:id="rId27"/>
   </p:sldIdLst>
   <p:sldSz cx="9144000" cy="6858000" type="screen4x3"/>
   <p:notesSz cx="6858000" cy="9144000"/>
@@ -216,7 +217,7 @@
           <a:p>
             <a:fld id="{C68BA279-9BF2-4A06-B9AF-8A73EDCCA3E2}" type="datetimeFigureOut">
               <a:rPr lang="en-US" smtClean="0"/>
-              <a:t>22-Mar-19</a:t>
+              <a:t>23-Mar-19</a:t>
             </a:fld>
             <a:endParaRPr lang="en-US"/>
           </a:p>
@@ -749,7 +750,7 @@
           <a:p>
             <a:fld id="{F928AF0E-B02C-4F75-988D-F732CEEC776A}" type="datetimeFigureOut">
               <a:rPr lang="en-US" smtClean="0"/>
-              <a:t>22-Mar-19</a:t>
+              <a:t>23-Mar-19</a:t>
             </a:fld>
             <a:endParaRPr lang="en-US"/>
           </a:p>
@@ -919,7 +920,7 @@
           <a:p>
             <a:fld id="{F928AF0E-B02C-4F75-988D-F732CEEC776A}" type="datetimeFigureOut">
               <a:rPr lang="en-US" smtClean="0"/>
-              <a:t>22-Mar-19</a:t>
+              <a:t>23-Mar-19</a:t>
             </a:fld>
             <a:endParaRPr lang="en-US"/>
           </a:p>
@@ -1099,7 +1100,7 @@
           <a:p>
             <a:fld id="{F928AF0E-B02C-4F75-988D-F732CEEC776A}" type="datetimeFigureOut">
               <a:rPr lang="en-US" smtClean="0"/>
-              <a:t>22-Mar-19</a:t>
+              <a:t>23-Mar-19</a:t>
             </a:fld>
             <a:endParaRPr lang="en-US"/>
           </a:p>
@@ -1269,7 +1270,7 @@
           <a:p>
             <a:fld id="{F928AF0E-B02C-4F75-988D-F732CEEC776A}" type="datetimeFigureOut">
               <a:rPr lang="en-US" smtClean="0"/>
-              <a:t>22-Mar-19</a:t>
+              <a:t>23-Mar-19</a:t>
             </a:fld>
             <a:endParaRPr lang="en-US"/>
           </a:p>
@@ -1515,7 +1516,7 @@
           <a:p>
             <a:fld id="{F928AF0E-B02C-4F75-988D-F732CEEC776A}" type="datetimeFigureOut">
               <a:rPr lang="en-US" smtClean="0"/>
-              <a:t>22-Mar-19</a:t>
+              <a:t>23-Mar-19</a:t>
             </a:fld>
             <a:endParaRPr lang="en-US"/>
           </a:p>
@@ -1803,7 +1804,7 @@
           <a:p>
             <a:fld id="{F928AF0E-B02C-4F75-988D-F732CEEC776A}" type="datetimeFigureOut">
               <a:rPr lang="en-US" smtClean="0"/>
-              <a:t>22-Mar-19</a:t>
+              <a:t>23-Mar-19</a:t>
             </a:fld>
             <a:endParaRPr lang="en-US"/>
           </a:p>
@@ -2225,7 +2226,7 @@
           <a:p>
             <a:fld id="{F928AF0E-B02C-4F75-988D-F732CEEC776A}" type="datetimeFigureOut">
               <a:rPr lang="en-US" smtClean="0"/>
-              <a:t>22-Mar-19</a:t>
+              <a:t>23-Mar-19</a:t>
             </a:fld>
             <a:endParaRPr lang="en-US"/>
           </a:p>
@@ -2343,7 +2344,7 @@
           <a:p>
             <a:fld id="{F928AF0E-B02C-4F75-988D-F732CEEC776A}" type="datetimeFigureOut">
               <a:rPr lang="en-US" smtClean="0"/>
-              <a:t>22-Mar-19</a:t>
+              <a:t>23-Mar-19</a:t>
             </a:fld>
             <a:endParaRPr lang="en-US"/>
           </a:p>
@@ -2438,7 +2439,7 @@
           <a:p>
             <a:fld id="{F928AF0E-B02C-4F75-988D-F732CEEC776A}" type="datetimeFigureOut">
               <a:rPr lang="en-US" smtClean="0"/>
-              <a:t>22-Mar-19</a:t>
+              <a:t>23-Mar-19</a:t>
             </a:fld>
             <a:endParaRPr lang="en-US"/>
           </a:p>
@@ -2715,7 +2716,7 @@
           <a:p>
             <a:fld id="{F928AF0E-B02C-4F75-988D-F732CEEC776A}" type="datetimeFigureOut">
               <a:rPr lang="en-US" smtClean="0"/>
-              <a:t>22-Mar-19</a:t>
+              <a:t>23-Mar-19</a:t>
             </a:fld>
             <a:endParaRPr lang="en-US"/>
           </a:p>
@@ -2968,7 +2969,7 @@
           <a:p>
             <a:fld id="{F928AF0E-B02C-4F75-988D-F732CEEC776A}" type="datetimeFigureOut">
               <a:rPr lang="en-US" smtClean="0"/>
-              <a:t>22-Mar-19</a:t>
+              <a:t>23-Mar-19</a:t>
             </a:fld>
             <a:endParaRPr lang="en-US"/>
           </a:p>
@@ -3181,7 +3182,7 @@
           <a:p>
             <a:fld id="{F928AF0E-B02C-4F75-988D-F732CEEC776A}" type="datetimeFigureOut">
               <a:rPr lang="en-US" smtClean="0"/>
-              <a:t>22-Mar-19</a:t>
+              <a:t>23-Mar-19</a:t>
             </a:fld>
             <a:endParaRPr lang="en-US"/>
           </a:p>
@@ -3699,7 +3700,6 @@
               <a:rPr lang="en-US" dirty="0"/>
               <a:t>Package Manager Python</a:t>
             </a:r>
-            <a:endParaRPr lang="en-US" dirty="0"/>
           </a:p>
         </p:txBody>
       </p:sp>
@@ -4238,15 +4238,7 @@
             </a:r>
             <a:r>
               <a:rPr lang="en-US" sz="2000" dirty="0" smtClean="0"/>
-              <a:t> </a:t>
-            </a:r>
-            <a:r>
-              <a:rPr lang="en-US" sz="2000" dirty="0" smtClean="0"/>
-              <a:t>--</a:t>
-            </a:r>
-            <a:r>
-              <a:rPr lang="en-US" sz="2000" dirty="0" smtClean="0"/>
-              <a:t>upgrade </a:t>
+              <a:t> --upgrade </a:t>
             </a:r>
             <a:r>
               <a:rPr lang="en-US" sz="2000" dirty="0" err="1" smtClean="0"/>
@@ -10199,10 +10191,686 @@
             <a:pPr marL="0" indent="0">
               <a:buNone/>
             </a:pPr>
+            <a:r>
+              <a:rPr lang="en-US" sz="2000" dirty="0" err="1" smtClean="0"/>
+              <a:t>Kondisi</a:t>
+            </a:r>
+            <a:r>
+              <a:rPr lang="en-US" sz="2000" dirty="0" smtClean="0"/>
+              <a:t> </a:t>
+            </a:r>
+            <a:r>
+              <a:rPr lang="en-US" sz="2000" dirty="0" err="1" smtClean="0"/>
+              <a:t>pada</a:t>
+            </a:r>
+            <a:r>
+              <a:rPr lang="en-US" sz="2000" dirty="0" smtClean="0"/>
+              <a:t> </a:t>
+            </a:r>
+            <a:r>
+              <a:rPr lang="en-US" sz="2000" dirty="0" err="1" smtClean="0"/>
+              <a:t>bahasa</a:t>
+            </a:r>
+            <a:r>
+              <a:rPr lang="en-US" sz="2000" dirty="0" smtClean="0"/>
+              <a:t> </a:t>
+            </a:r>
+            <a:r>
+              <a:rPr lang="en-US" sz="2000" dirty="0" err="1" smtClean="0"/>
+              <a:t>pemrograman</a:t>
+            </a:r>
+            <a:r>
+              <a:rPr lang="en-US" sz="2000" dirty="0" smtClean="0"/>
+              <a:t> Python </a:t>
+            </a:r>
+            <a:r>
+              <a:rPr lang="en-US" sz="2000" dirty="0" err="1" smtClean="0"/>
+              <a:t>dibagi</a:t>
+            </a:r>
+            <a:r>
+              <a:rPr lang="en-US" sz="2000" dirty="0" smtClean="0"/>
+              <a:t> </a:t>
+            </a:r>
+            <a:r>
+              <a:rPr lang="en-US" sz="2000" dirty="0" err="1" smtClean="0"/>
+              <a:t>menjadi</a:t>
+            </a:r>
+            <a:r>
+              <a:rPr lang="en-US" sz="2000" dirty="0" smtClean="0"/>
+              <a:t> 3, </a:t>
+            </a:r>
+            <a:r>
+              <a:rPr lang="en-US" sz="2000" dirty="0" err="1" smtClean="0"/>
+              <a:t>berikut</a:t>
+            </a:r>
+            <a:r>
+              <a:rPr lang="en-US" sz="2000" dirty="0" smtClean="0"/>
+              <a:t> </a:t>
+            </a:r>
+            <a:r>
+              <a:rPr lang="en-US" sz="2000" dirty="0" err="1" smtClean="0"/>
+              <a:t>adalah</a:t>
+            </a:r>
+            <a:r>
+              <a:rPr lang="en-US" sz="2000" dirty="0" smtClean="0"/>
+              <a:t> </a:t>
+            </a:r>
+            <a:r>
+              <a:rPr lang="en-US" sz="2000" dirty="0" err="1" smtClean="0"/>
+              <a:t>ketiga</a:t>
+            </a:r>
+            <a:r>
+              <a:rPr lang="en-US" sz="2000" dirty="0" smtClean="0"/>
+              <a:t> </a:t>
+            </a:r>
+            <a:r>
+              <a:rPr lang="en-US" sz="2000" dirty="0" err="1" smtClean="0"/>
+              <a:t>buah</a:t>
+            </a:r>
+            <a:r>
+              <a:rPr lang="en-US" sz="2000" dirty="0" smtClean="0"/>
+              <a:t> </a:t>
+            </a:r>
+            <a:r>
+              <a:rPr lang="en-US" sz="2000" dirty="0" err="1" smtClean="0"/>
+              <a:t>kondisi</a:t>
+            </a:r>
+            <a:r>
+              <a:rPr lang="en-US" sz="2000" dirty="0" smtClean="0"/>
+              <a:t> </a:t>
+            </a:r>
+            <a:r>
+              <a:rPr lang="en-US" sz="2000" dirty="0" err="1" smtClean="0"/>
+              <a:t>tersebut</a:t>
+            </a:r>
+            <a:r>
+              <a:rPr lang="en-US" sz="2000" dirty="0" smtClean="0"/>
+              <a:t> </a:t>
+            </a:r>
+            <a:r>
+              <a:rPr lang="en-US" sz="2000" dirty="0" err="1" smtClean="0"/>
+              <a:t>dan</a:t>
+            </a:r>
+            <a:r>
+              <a:rPr lang="en-US" sz="2000" dirty="0" smtClean="0"/>
+              <a:t> </a:t>
+            </a:r>
+            <a:r>
+              <a:rPr lang="en-US" sz="2000" dirty="0" err="1" smtClean="0"/>
+              <a:t>juga</a:t>
+            </a:r>
+            <a:r>
+              <a:rPr lang="en-US" sz="2000" dirty="0" smtClean="0"/>
+              <a:t> </a:t>
+            </a:r>
+            <a:r>
+              <a:rPr lang="en-US" sz="2000" dirty="0" err="1" smtClean="0"/>
+              <a:t>penjelasannya</a:t>
+            </a:r>
+            <a:r>
+              <a:rPr lang="en-US" sz="2000" dirty="0" smtClean="0"/>
+              <a:t>.</a:t>
+            </a:r>
+          </a:p>
+          <a:p>
+            <a:pPr marL="0" indent="0">
+              <a:buNone/>
+            </a:pPr>
+            <a:r>
+              <a:rPr lang="en-US" sz="2000" dirty="0" smtClean="0"/>
+              <a:t>a. </a:t>
+            </a:r>
+            <a:r>
+              <a:rPr lang="en-US" sz="2000" dirty="0" err="1" smtClean="0"/>
+              <a:t>Kondisi</a:t>
+            </a:r>
+            <a:r>
+              <a:rPr lang="en-US" sz="2000" dirty="0" smtClean="0"/>
+              <a:t> </a:t>
+            </a:r>
+            <a:r>
+              <a:rPr lang="en-US" sz="2000" dirty="0"/>
+              <a:t>If, </a:t>
+            </a:r>
+            <a:r>
+              <a:rPr lang="en-US" sz="2000" dirty="0" err="1"/>
+              <a:t>digunakan</a:t>
+            </a:r>
+            <a:r>
+              <a:rPr lang="en-US" sz="2000" dirty="0"/>
+              <a:t> </a:t>
+            </a:r>
+            <a:r>
+              <a:rPr lang="en-US" sz="2000" dirty="0" err="1"/>
+              <a:t>untuk</a:t>
+            </a:r>
+            <a:r>
+              <a:rPr lang="en-US" sz="2000" dirty="0"/>
+              <a:t> </a:t>
+            </a:r>
+            <a:r>
+              <a:rPr lang="en-US" sz="2000" dirty="0" err="1"/>
+              <a:t>mengantisipasi</a:t>
+            </a:r>
+            <a:r>
+              <a:rPr lang="en-US" sz="2000" dirty="0"/>
+              <a:t> </a:t>
+            </a:r>
+            <a:r>
+              <a:rPr lang="en-US" sz="2000" dirty="0" err="1"/>
+              <a:t>kondisi</a:t>
+            </a:r>
+            <a:r>
+              <a:rPr lang="en-US" sz="2000" dirty="0"/>
+              <a:t> yang </a:t>
+            </a:r>
+            <a:r>
+              <a:rPr lang="en-US" sz="2000" dirty="0" err="1"/>
+              <a:t>terjadi</a:t>
+            </a:r>
+            <a:r>
+              <a:rPr lang="en-US" sz="2000" dirty="0"/>
+              <a:t> </a:t>
+            </a:r>
+            <a:r>
+              <a:rPr lang="en-US" sz="2000" dirty="0" err="1"/>
+              <a:t>saat</a:t>
+            </a:r>
+            <a:r>
+              <a:rPr lang="en-US" sz="2000" dirty="0"/>
+              <a:t> </a:t>
+            </a:r>
+            <a:r>
+              <a:rPr lang="en-US" sz="2000" dirty="0" err="1" smtClean="0"/>
+              <a:t>jalannya</a:t>
+            </a:r>
+            <a:r>
+              <a:rPr lang="en-US" sz="2000" dirty="0" smtClean="0"/>
+              <a:t> </a:t>
+            </a:r>
+            <a:r>
+              <a:rPr lang="en-US" sz="2000" dirty="0"/>
+              <a:t>program </a:t>
+            </a:r>
+            <a:r>
+              <a:rPr lang="en-US" sz="2000" dirty="0" err="1"/>
+              <a:t>dan</a:t>
+            </a:r>
+            <a:r>
+              <a:rPr lang="en-US" sz="2000" dirty="0"/>
+              <a:t> </a:t>
+            </a:r>
+            <a:r>
+              <a:rPr lang="en-US" sz="2000" dirty="0" err="1"/>
+              <a:t>menentukan</a:t>
+            </a:r>
+            <a:r>
+              <a:rPr lang="en-US" sz="2000" dirty="0"/>
+              <a:t> </a:t>
+            </a:r>
+            <a:r>
+              <a:rPr lang="en-US" sz="2000" dirty="0" err="1"/>
+              <a:t>tindakan</a:t>
+            </a:r>
+            <a:r>
+              <a:rPr lang="en-US" sz="2000" dirty="0"/>
+              <a:t> </a:t>
+            </a:r>
+            <a:r>
+              <a:rPr lang="en-US" sz="2000" dirty="0" err="1"/>
+              <a:t>apa</a:t>
+            </a:r>
+            <a:r>
+              <a:rPr lang="en-US" sz="2000" dirty="0"/>
+              <a:t> yang </a:t>
+            </a:r>
+            <a:r>
+              <a:rPr lang="en-US" sz="2000" dirty="0" err="1"/>
+              <a:t>akan</a:t>
+            </a:r>
+            <a:r>
+              <a:rPr lang="en-US" sz="2000" dirty="0"/>
+              <a:t> </a:t>
+            </a:r>
+            <a:r>
+              <a:rPr lang="en-US" sz="2000" dirty="0" err="1"/>
+              <a:t>diambil</a:t>
+            </a:r>
+            <a:r>
+              <a:rPr lang="en-US" sz="2000" dirty="0"/>
+              <a:t> </a:t>
+            </a:r>
+            <a:r>
+              <a:rPr lang="en-US" sz="2000" dirty="0" err="1"/>
+              <a:t>sesuai</a:t>
+            </a:r>
+            <a:r>
+              <a:rPr lang="en-US" sz="2000" dirty="0"/>
+              <a:t> </a:t>
+            </a:r>
+            <a:r>
+              <a:rPr lang="en-US" sz="2000" dirty="0" err="1"/>
+              <a:t>dengan</a:t>
+            </a:r>
+            <a:r>
+              <a:rPr lang="en-US" sz="2000" dirty="0"/>
+              <a:t> </a:t>
+            </a:r>
+            <a:r>
+              <a:rPr lang="en-US" sz="2000" dirty="0" err="1"/>
+              <a:t>kondisi</a:t>
+            </a:r>
+            <a:r>
+              <a:rPr lang="en-US" sz="2000" dirty="0" smtClean="0"/>
+              <a:t>. </a:t>
+            </a:r>
+            <a:r>
+              <a:rPr lang="en-US" sz="2000" dirty="0" err="1" smtClean="0"/>
+              <a:t>Contohnya</a:t>
+            </a:r>
+            <a:r>
+              <a:rPr lang="en-US" sz="2000" dirty="0" smtClean="0"/>
+              <a:t> </a:t>
+            </a:r>
+            <a:r>
+              <a:rPr lang="en-US" sz="2000" dirty="0" err="1" smtClean="0"/>
+              <a:t>adalah</a:t>
+            </a:r>
+            <a:r>
+              <a:rPr lang="en-US" sz="2000" dirty="0" smtClean="0"/>
+              <a:t> </a:t>
+            </a:r>
+          </a:p>
+          <a:p>
+            <a:pPr marL="0" indent="0">
+              <a:buNone/>
+            </a:pPr>
+            <a:endParaRPr lang="en-US" sz="2000" dirty="0" smtClean="0"/>
+          </a:p>
+          <a:p>
+            <a:pPr marL="0" indent="0">
+              <a:buNone/>
+            </a:pPr>
+            <a:endParaRPr lang="en-US" sz="2000" dirty="0" smtClean="0"/>
+          </a:p>
+          <a:p>
+            <a:pPr marL="0" indent="0">
+              <a:buNone/>
+            </a:pPr>
+            <a:endParaRPr lang="en-US" sz="2000" dirty="0"/>
+          </a:p>
+          <a:p>
+            <a:pPr marL="0" indent="0">
+              <a:buNone/>
+            </a:pPr>
+            <a:r>
+              <a:rPr lang="en-US" sz="2000" dirty="0" smtClean="0"/>
+              <a:t>b. </a:t>
+            </a:r>
+            <a:r>
+              <a:rPr lang="en-US" sz="2000" dirty="0" err="1" smtClean="0"/>
+              <a:t>Kondisi</a:t>
+            </a:r>
+            <a:r>
+              <a:rPr lang="en-US" sz="2000" dirty="0" smtClean="0"/>
+              <a:t> </a:t>
+            </a:r>
+            <a:r>
+              <a:rPr lang="en-US" sz="2000" dirty="0"/>
+              <a:t>If Else, </a:t>
+            </a:r>
+            <a:r>
+              <a:rPr lang="en-US" sz="2000" dirty="0" err="1"/>
+              <a:t>tidak</a:t>
+            </a:r>
+            <a:r>
+              <a:rPr lang="en-US" sz="2000" dirty="0"/>
+              <a:t> </a:t>
+            </a:r>
+            <a:r>
+              <a:rPr lang="en-US" sz="2000" dirty="0" err="1"/>
+              <a:t>hanya</a:t>
+            </a:r>
+            <a:r>
+              <a:rPr lang="en-US" sz="2000" dirty="0"/>
+              <a:t> </a:t>
+            </a:r>
+            <a:r>
+              <a:rPr lang="en-US" sz="2000" dirty="0" err="1"/>
+              <a:t>digunakan</a:t>
+            </a:r>
+            <a:r>
+              <a:rPr lang="en-US" sz="2000" dirty="0"/>
+              <a:t> </a:t>
+            </a:r>
+            <a:r>
+              <a:rPr lang="en-US" sz="2000" dirty="0" err="1"/>
+              <a:t>untuk</a:t>
+            </a:r>
+            <a:r>
+              <a:rPr lang="en-US" sz="2000" dirty="0"/>
+              <a:t> </a:t>
+            </a:r>
+            <a:r>
+              <a:rPr lang="en-US" sz="2000" dirty="0" err="1"/>
+              <a:t>menentukan</a:t>
+            </a:r>
+            <a:r>
+              <a:rPr lang="en-US" sz="2000" dirty="0"/>
+              <a:t> </a:t>
+            </a:r>
+            <a:r>
+              <a:rPr lang="en-US" sz="2000" dirty="0" err="1"/>
+              <a:t>tindakan</a:t>
+            </a:r>
+            <a:r>
+              <a:rPr lang="en-US" sz="2000" dirty="0"/>
+              <a:t> </a:t>
+            </a:r>
+            <a:r>
+              <a:rPr lang="en-US" sz="2000" dirty="0" err="1"/>
+              <a:t>apa</a:t>
+            </a:r>
+            <a:r>
+              <a:rPr lang="en-US" sz="2000" dirty="0"/>
+              <a:t> yang </a:t>
+            </a:r>
+            <a:r>
+              <a:rPr lang="en-US" sz="2000" dirty="0" err="1"/>
+              <a:t>akan</a:t>
+            </a:r>
+            <a:r>
+              <a:rPr lang="en-US" sz="2000" dirty="0"/>
+              <a:t> </a:t>
+            </a:r>
+            <a:r>
+              <a:rPr lang="en-US" sz="2000" dirty="0" err="1"/>
+              <a:t>diambil</a:t>
+            </a:r>
+            <a:r>
+              <a:rPr lang="en-US" sz="2000" dirty="0"/>
+              <a:t> </a:t>
+            </a:r>
+            <a:r>
+              <a:rPr lang="en-US" sz="2000" dirty="0" err="1"/>
+              <a:t>sesuai</a:t>
+            </a:r>
+            <a:r>
+              <a:rPr lang="en-US" sz="2000" dirty="0"/>
+              <a:t> </a:t>
+            </a:r>
+            <a:r>
+              <a:rPr lang="en-US" sz="2000" dirty="0" err="1"/>
+              <a:t>dengan</a:t>
+            </a:r>
+            <a:r>
+              <a:rPr lang="en-US" sz="2000" dirty="0"/>
+              <a:t> </a:t>
+            </a:r>
+            <a:r>
+              <a:rPr lang="en-US" sz="2000" dirty="0" err="1"/>
+              <a:t>kondisi</a:t>
+            </a:r>
+            <a:r>
+              <a:rPr lang="en-US" sz="2000" dirty="0"/>
+              <a:t>, </a:t>
+            </a:r>
+            <a:r>
+              <a:rPr lang="en-US" sz="2000" dirty="0" err="1"/>
+              <a:t>tetapi</a:t>
+            </a:r>
+            <a:r>
+              <a:rPr lang="en-US" sz="2000" dirty="0"/>
+              <a:t> </a:t>
+            </a:r>
+            <a:r>
+              <a:rPr lang="en-US" sz="2000" dirty="0" err="1"/>
+              <a:t>juga</a:t>
+            </a:r>
+            <a:r>
+              <a:rPr lang="en-US" sz="2000" dirty="0"/>
+              <a:t> </a:t>
+            </a:r>
+            <a:r>
+              <a:rPr lang="en-US" sz="2000" dirty="0" err="1"/>
+              <a:t>digunakan</a:t>
+            </a:r>
+            <a:r>
+              <a:rPr lang="en-US" sz="2000" dirty="0"/>
+              <a:t> </a:t>
+            </a:r>
+            <a:r>
+              <a:rPr lang="en-US" sz="2000" dirty="0" err="1"/>
+              <a:t>untuk</a:t>
+            </a:r>
+            <a:r>
+              <a:rPr lang="en-US" sz="2000" dirty="0"/>
+              <a:t> </a:t>
+            </a:r>
+            <a:r>
+              <a:rPr lang="en-US" sz="2000" dirty="0" err="1"/>
+              <a:t>menentukan</a:t>
+            </a:r>
+            <a:r>
+              <a:rPr lang="en-US" sz="2000" dirty="0"/>
+              <a:t> </a:t>
+            </a:r>
+            <a:r>
+              <a:rPr lang="en-US" sz="2000" dirty="0" err="1"/>
+              <a:t>tindakan</a:t>
+            </a:r>
+            <a:r>
+              <a:rPr lang="en-US" sz="2000" dirty="0"/>
+              <a:t> </a:t>
+            </a:r>
+            <a:r>
+              <a:rPr lang="en-US" sz="2000" dirty="0" err="1"/>
+              <a:t>apa</a:t>
+            </a:r>
+            <a:r>
+              <a:rPr lang="en-US" sz="2000" dirty="0"/>
+              <a:t> yang </a:t>
+            </a:r>
+            <a:r>
+              <a:rPr lang="en-US" sz="2000" dirty="0" err="1"/>
+              <a:t>akan</a:t>
+            </a:r>
+            <a:r>
+              <a:rPr lang="en-US" sz="2000" dirty="0"/>
+              <a:t> </a:t>
+            </a:r>
+            <a:r>
+              <a:rPr lang="en-US" sz="2000" dirty="0" err="1"/>
+              <a:t>diambil</a:t>
+            </a:r>
+            <a:r>
+              <a:rPr lang="en-US" sz="2000" dirty="0"/>
+              <a:t>/</a:t>
+            </a:r>
+            <a:r>
+              <a:rPr lang="en-US" sz="2000" dirty="0" err="1"/>
+              <a:t>dijalankan</a:t>
+            </a:r>
+            <a:r>
+              <a:rPr lang="en-US" sz="2000" dirty="0"/>
+              <a:t> </a:t>
+            </a:r>
+            <a:r>
+              <a:rPr lang="en-US" sz="2000" dirty="0" err="1"/>
+              <a:t>jika</a:t>
+            </a:r>
+            <a:r>
+              <a:rPr lang="en-US" sz="2000" dirty="0"/>
+              <a:t> </a:t>
+            </a:r>
+            <a:r>
+              <a:rPr lang="en-US" sz="2000" dirty="0" err="1"/>
+              <a:t>kondisi</a:t>
+            </a:r>
+            <a:r>
+              <a:rPr lang="en-US" sz="2000" dirty="0"/>
+              <a:t> </a:t>
+            </a:r>
+            <a:r>
+              <a:rPr lang="en-US" sz="2000" dirty="0" err="1"/>
+              <a:t>tidak</a:t>
+            </a:r>
+            <a:r>
+              <a:rPr lang="en-US" sz="2000" dirty="0"/>
+              <a:t> </a:t>
+            </a:r>
+            <a:r>
+              <a:rPr lang="en-US" sz="2000" dirty="0" err="1"/>
+              <a:t>sesuai</a:t>
+            </a:r>
+            <a:r>
+              <a:rPr lang="en-US" sz="2000" dirty="0" smtClean="0"/>
+              <a:t>. </a:t>
+            </a:r>
+            <a:r>
+              <a:rPr lang="en-US" sz="2000" dirty="0" err="1" smtClean="0"/>
+              <a:t>Contohnya</a:t>
+            </a:r>
+            <a:r>
+              <a:rPr lang="en-US" sz="2000" dirty="0" smtClean="0"/>
+              <a:t> </a:t>
+            </a:r>
+            <a:r>
+              <a:rPr lang="en-US" sz="2000" dirty="0" err="1" smtClean="0"/>
+              <a:t>adalah</a:t>
+            </a:r>
             <a:endParaRPr lang="en-US" sz="2000" dirty="0"/>
           </a:p>
         </p:txBody>
       </p:sp>
+      <p:pic>
+        <p:nvPicPr>
+          <p:cNvPr id="1026" name="Picture 2"/>
+          <p:cNvPicPr>
+            <a:picLocks noChangeAspect="1" noChangeArrowheads="1"/>
+          </p:cNvPicPr>
+          <p:nvPr/>
+        </p:nvPicPr>
+        <p:blipFill>
+          <a:blip r:embed="rId2">
+            <a:extLst>
+              <a:ext uri="{28A0092B-C50C-407E-A947-70E740481C1C}">
+                <a14:useLocalDpi xmlns:a14="http://schemas.microsoft.com/office/drawing/2010/main" val="0"/>
+              </a:ext>
+            </a:extLst>
+          </a:blip>
+          <a:srcRect/>
+          <a:stretch>
+            <a:fillRect/>
+          </a:stretch>
+        </p:blipFill>
+        <p:spPr bwMode="auto">
+          <a:xfrm>
+            <a:off x="2362200" y="3124200"/>
+            <a:ext cx="4716888" cy="1143000"/>
+          </a:xfrm>
+          <a:prstGeom prst="rect">
+            <a:avLst/>
+          </a:prstGeom>
+          <a:noFill/>
+          <a:ln>
+            <a:noFill/>
+          </a:ln>
+          <a:effectLst/>
+          <a:extLst>
+            <a:ext uri="{909E8E84-426E-40DD-AFC4-6F175D3DCCD1}">
+              <a14:hiddenFill xmlns:a14="http://schemas.microsoft.com/office/drawing/2010/main">
+                <a:solidFill>
+                  <a:schemeClr val="accent1"/>
+                </a:solidFill>
+              </a14:hiddenFill>
+            </a:ext>
+            <a:ext uri="{91240B29-F687-4F45-9708-019B960494DF}">
+              <a14:hiddenLine xmlns:a14="http://schemas.microsoft.com/office/drawing/2010/main" w="9525">
+                <a:solidFill>
+                  <a:schemeClr val="tx1"/>
+                </a:solidFill>
+                <a:miter lim="800000"/>
+                <a:headEnd/>
+                <a:tailEnd/>
+              </a14:hiddenLine>
+            </a:ext>
+            <a:ext uri="{AF507438-7753-43E0-B8FC-AC1667EBCBE1}">
+              <a14:hiddenEffects xmlns:a14="http://schemas.microsoft.com/office/drawing/2010/main">
+                <a:effectLst>
+                  <a:outerShdw dist="35921" dir="2700000" algn="ctr" rotWithShape="0">
+                    <a:schemeClr val="bg2"/>
+                  </a:outerShdw>
+                </a:effectLst>
+              </a14:hiddenEffects>
+            </a:ext>
+          </a:extLst>
+        </p:spPr>
+      </p:pic>
+      <p:pic>
+        <p:nvPicPr>
+          <p:cNvPr id="1027" name="Picture 3"/>
+          <p:cNvPicPr>
+            <a:picLocks noChangeAspect="1" noChangeArrowheads="1"/>
+          </p:cNvPicPr>
+          <p:nvPr/>
+        </p:nvPicPr>
+        <p:blipFill>
+          <a:blip r:embed="rId3">
+            <a:extLst>
+              <a:ext uri="{28A0092B-C50C-407E-A947-70E740481C1C}">
+                <a14:useLocalDpi xmlns:a14="http://schemas.microsoft.com/office/drawing/2010/main" val="0"/>
+              </a:ext>
+            </a:extLst>
+          </a:blip>
+          <a:srcRect/>
+          <a:stretch>
+            <a:fillRect/>
+          </a:stretch>
+        </p:blipFill>
+        <p:spPr bwMode="auto">
+          <a:xfrm>
+            <a:off x="2590800" y="5437481"/>
+            <a:ext cx="3810000" cy="1222963"/>
+          </a:xfrm>
+          <a:prstGeom prst="rect">
+            <a:avLst/>
+          </a:prstGeom>
+          <a:noFill/>
+          <a:ln>
+            <a:noFill/>
+          </a:ln>
+          <a:effectLst/>
+          <a:extLst>
+            <a:ext uri="{909E8E84-426E-40DD-AFC4-6F175D3DCCD1}">
+              <a14:hiddenFill xmlns:a14="http://schemas.microsoft.com/office/drawing/2010/main">
+                <a:solidFill>
+                  <a:schemeClr val="accent1"/>
+                </a:solidFill>
+              </a14:hiddenFill>
+            </a:ext>
+            <a:ext uri="{91240B29-F687-4F45-9708-019B960494DF}">
+              <a14:hiddenLine xmlns:a14="http://schemas.microsoft.com/office/drawing/2010/main" w="9525">
+                <a:solidFill>
+                  <a:schemeClr val="tx1"/>
+                </a:solidFill>
+                <a:miter lim="800000"/>
+                <a:headEnd/>
+                <a:tailEnd/>
+              </a14:hiddenLine>
+            </a:ext>
+            <a:ext uri="{AF507438-7753-43E0-B8FC-AC1667EBCBE1}">
+              <a14:hiddenEffects xmlns:a14="http://schemas.microsoft.com/office/drawing/2010/main">
+                <a:effectLst>
+                  <a:outerShdw dist="35921" dir="2700000" algn="ctr" rotWithShape="0">
+                    <a:schemeClr val="bg2"/>
+                  </a:outerShdw>
+                </a:effectLst>
+              </a14:hiddenEffects>
+            </a:ext>
+          </a:extLst>
+        </p:spPr>
+      </p:pic>
     </p:spTree>
     <p:extLst>
       <p:ext uri="{BB962C8B-B14F-4D97-AF65-F5344CB8AC3E}">
@@ -10213,6 +10881,13 @@
   <p:clrMapOvr>
     <a:masterClrMapping/>
   </p:clrMapOvr>
+  <p:timing>
+    <p:tnLst>
+      <p:par>
+        <p:cTn id="1" dur="indefinite" restart="never" nodeType="tmRoot"/>
+      </p:par>
+    </p:tnLst>
+  </p:timing>
 </p:sld>
 </file>
 
@@ -10251,11 +10926,15 @@
             <a:pPr algn="l"/>
             <a:r>
               <a:rPr lang="en-US" dirty="0" err="1" smtClean="0"/>
-              <a:t>Pengertian</a:t>
+              <a:t>Pengenalan</a:t>
             </a:r>
             <a:r>
               <a:rPr lang="en-US" dirty="0" smtClean="0"/>
-              <a:t> Python</a:t>
+              <a:t> </a:t>
+            </a:r>
+            <a:r>
+              <a:rPr lang="en-US" dirty="0" smtClean="0"/>
+              <a:t>Python</a:t>
             </a:r>
             <a:endParaRPr lang="en-US" dirty="0"/>
           </a:p>
@@ -11224,7 +11903,24 @@
           <a:bodyPr/>
           <a:lstStyle/>
           <a:p>
-            <a:endParaRPr lang="en-US"/>
+            <a:pPr algn="l"/>
+            <a:r>
+              <a:rPr lang="en-US" dirty="0" err="1"/>
+              <a:t>Kondisi</a:t>
+            </a:r>
+            <a:r>
+              <a:rPr lang="en-US" dirty="0"/>
+              <a:t> </a:t>
+            </a:r>
+            <a:r>
+              <a:rPr lang="en-US" dirty="0" err="1"/>
+              <a:t>Pada</a:t>
+            </a:r>
+            <a:r>
+              <a:rPr lang="en-US" dirty="0"/>
+              <a:t> Python</a:t>
+            </a:r>
+            <a:endParaRPr lang="en-US" dirty="0"/>
           </a:p>
         </p:txBody>
       </p:sp>
@@ -11238,15 +11934,375 @@
             <p:ph idx="1"/>
           </p:nvPr>
         </p:nvSpPr>
-        <p:spPr/>
+        <p:spPr>
+          <a:xfrm>
+            <a:off x="0" y="1600200"/>
+            <a:ext cx="9144000" cy="4525963"/>
+          </a:xfrm>
+        </p:spPr>
         <p:txBody>
-          <a:bodyPr/>
+          <a:bodyPr>
+            <a:normAutofit/>
+          </a:bodyPr>
           <a:lstStyle/>
           <a:p>
-            <a:endParaRPr lang="en-US"/>
+            <a:pPr marL="0" indent="0">
+              <a:buNone/>
+            </a:pPr>
+            <a:r>
+              <a:rPr lang="en-US" sz="2000" dirty="0" smtClean="0"/>
+              <a:t>c. </a:t>
+            </a:r>
+            <a:r>
+              <a:rPr lang="en-US" sz="2000" dirty="0" err="1" smtClean="0"/>
+              <a:t>Kondisi</a:t>
+            </a:r>
+            <a:r>
+              <a:rPr lang="en-US" sz="2000" dirty="0" smtClean="0"/>
+              <a:t> </a:t>
+            </a:r>
+            <a:r>
+              <a:rPr lang="en-US" sz="2000" dirty="0" err="1" smtClean="0"/>
+              <a:t>Elif</a:t>
+            </a:r>
+            <a:r>
+              <a:rPr lang="en-US" sz="2000" dirty="0"/>
+              <a:t>, </a:t>
+            </a:r>
+            <a:r>
+              <a:rPr lang="en-US" sz="2000" dirty="0" err="1"/>
+              <a:t>merupakan</a:t>
+            </a:r>
+            <a:r>
+              <a:rPr lang="en-US" sz="2000" dirty="0"/>
+              <a:t> </a:t>
+            </a:r>
+            <a:r>
+              <a:rPr lang="en-US" sz="2000" dirty="0" err="1"/>
+              <a:t>lanjutan</a:t>
+            </a:r>
+            <a:r>
+              <a:rPr lang="en-US" sz="2000" dirty="0"/>
+              <a:t>/</a:t>
+            </a:r>
+            <a:r>
+              <a:rPr lang="en-US" sz="2000" dirty="0" err="1"/>
+              <a:t>percabangan</a:t>
+            </a:r>
+            <a:r>
+              <a:rPr lang="en-US" sz="2000" dirty="0"/>
+              <a:t> </a:t>
+            </a:r>
+            <a:r>
+              <a:rPr lang="en-US" sz="2000" dirty="0" err="1"/>
+              <a:t>logika</a:t>
+            </a:r>
+            <a:r>
+              <a:rPr lang="en-US" sz="2000" dirty="0"/>
+              <a:t> </a:t>
+            </a:r>
+            <a:r>
+              <a:rPr lang="en-US" sz="2000" dirty="0" err="1"/>
+              <a:t>dari</a:t>
+            </a:r>
+            <a:r>
+              <a:rPr lang="en-US" sz="2000" dirty="0"/>
+              <a:t> “</a:t>
+            </a:r>
+            <a:r>
+              <a:rPr lang="en-US" sz="2000" dirty="0" err="1"/>
+              <a:t>kondisi</a:t>
+            </a:r>
+            <a:r>
+              <a:rPr lang="en-US" sz="2000" dirty="0"/>
+              <a:t> if”. </a:t>
+            </a:r>
+            <a:r>
+              <a:rPr lang="en-US" sz="2000" dirty="0" err="1"/>
+              <a:t>Dengan</a:t>
+            </a:r>
+            <a:r>
+              <a:rPr lang="en-US" sz="2000" dirty="0"/>
+              <a:t> </a:t>
+            </a:r>
+            <a:r>
+              <a:rPr lang="en-US" sz="2000" dirty="0" err="1"/>
+              <a:t>elif</a:t>
+            </a:r>
+            <a:r>
+              <a:rPr lang="en-US" sz="2000" dirty="0"/>
+              <a:t> </a:t>
+            </a:r>
+            <a:r>
+              <a:rPr lang="en-US" sz="2000" dirty="0" err="1"/>
+              <a:t>kita</a:t>
+            </a:r>
+            <a:r>
+              <a:rPr lang="en-US" sz="2000" dirty="0"/>
+              <a:t> </a:t>
+            </a:r>
+            <a:r>
+              <a:rPr lang="en-US" sz="2000" dirty="0" err="1"/>
+              <a:t>bisa</a:t>
+            </a:r>
+            <a:r>
+              <a:rPr lang="en-US" sz="2000" dirty="0"/>
+              <a:t> </a:t>
+            </a:r>
+            <a:r>
+              <a:rPr lang="en-US" sz="2000" dirty="0" err="1"/>
+              <a:t>membuat</a:t>
+            </a:r>
+            <a:r>
+              <a:rPr lang="en-US" sz="2000" dirty="0"/>
+              <a:t> </a:t>
+            </a:r>
+            <a:r>
+              <a:rPr lang="en-US" sz="2000" dirty="0" err="1"/>
+              <a:t>kode</a:t>
+            </a:r>
+            <a:r>
+              <a:rPr lang="en-US" sz="2000" dirty="0"/>
+              <a:t> program yang </a:t>
+            </a:r>
+            <a:r>
+              <a:rPr lang="en-US" sz="2000" dirty="0" err="1"/>
+              <a:t>akan</a:t>
+            </a:r>
+            <a:r>
+              <a:rPr lang="en-US" sz="2000" dirty="0"/>
+              <a:t> </a:t>
+            </a:r>
+            <a:r>
+              <a:rPr lang="en-US" sz="2000" dirty="0" err="1"/>
+              <a:t>menyeleksi</a:t>
+            </a:r>
+            <a:r>
+              <a:rPr lang="en-US" sz="2000" dirty="0"/>
+              <a:t> </a:t>
+            </a:r>
+            <a:r>
+              <a:rPr lang="en-US" sz="2000" dirty="0" err="1"/>
+              <a:t>beberapa</a:t>
+            </a:r>
+            <a:r>
+              <a:rPr lang="en-US" sz="2000" dirty="0"/>
+              <a:t> </a:t>
+            </a:r>
+            <a:r>
+              <a:rPr lang="en-US" sz="2000" dirty="0" err="1"/>
+              <a:t>kemungkinan</a:t>
+            </a:r>
+            <a:r>
+              <a:rPr lang="en-US" sz="2000" dirty="0"/>
+              <a:t> yang </a:t>
+            </a:r>
+            <a:r>
+              <a:rPr lang="en-US" sz="2000" dirty="0" err="1"/>
+              <a:t>bisa</a:t>
+            </a:r>
+            <a:r>
+              <a:rPr lang="en-US" sz="2000" dirty="0"/>
+              <a:t> </a:t>
+            </a:r>
+            <a:r>
+              <a:rPr lang="en-US" sz="2000" dirty="0" err="1"/>
+              <a:t>terjadi</a:t>
+            </a:r>
+            <a:r>
+              <a:rPr lang="en-US" sz="2000" dirty="0"/>
+              <a:t>. </a:t>
+            </a:r>
+            <a:r>
+              <a:rPr lang="en-US" sz="2000" dirty="0" err="1"/>
+              <a:t>Hampir</a:t>
+            </a:r>
+            <a:r>
+              <a:rPr lang="en-US" sz="2000" dirty="0"/>
+              <a:t> </a:t>
+            </a:r>
+            <a:r>
+              <a:rPr lang="en-US" sz="2000" dirty="0" err="1"/>
+              <a:t>sama</a:t>
+            </a:r>
+            <a:r>
+              <a:rPr lang="en-US" sz="2000" dirty="0"/>
+              <a:t> </a:t>
+            </a:r>
+            <a:r>
+              <a:rPr lang="en-US" sz="2000" dirty="0" err="1"/>
+              <a:t>dengan</a:t>
+            </a:r>
+            <a:r>
+              <a:rPr lang="en-US" sz="2000" dirty="0"/>
+              <a:t> </a:t>
+            </a:r>
+            <a:r>
+              <a:rPr lang="en-US" sz="2000" dirty="0" err="1"/>
+              <a:t>kondisi</a:t>
+            </a:r>
+            <a:r>
+              <a:rPr lang="en-US" sz="2000" dirty="0"/>
+              <a:t> “else”, </a:t>
+            </a:r>
+            <a:r>
+              <a:rPr lang="en-US" sz="2000" dirty="0" err="1"/>
+              <a:t>bedanya</a:t>
+            </a:r>
+            <a:r>
+              <a:rPr lang="en-US" sz="2000" dirty="0"/>
+              <a:t> </a:t>
+            </a:r>
+            <a:r>
+              <a:rPr lang="en-US" sz="2000" dirty="0" err="1"/>
+              <a:t>kondisi</a:t>
+            </a:r>
+            <a:r>
+              <a:rPr lang="en-US" sz="2000" dirty="0"/>
+              <a:t> “</a:t>
+            </a:r>
+            <a:r>
+              <a:rPr lang="en-US" sz="2000" dirty="0" err="1"/>
+              <a:t>elif</a:t>
+            </a:r>
+            <a:r>
+              <a:rPr lang="en-US" sz="2000" dirty="0"/>
+              <a:t>” </a:t>
+            </a:r>
+            <a:r>
+              <a:rPr lang="en-US" sz="2000" dirty="0" err="1"/>
+              <a:t>bisa</a:t>
+            </a:r>
+            <a:r>
+              <a:rPr lang="en-US" sz="2000" dirty="0"/>
+              <a:t> </a:t>
+            </a:r>
+            <a:r>
+              <a:rPr lang="en-US" sz="2000" dirty="0" err="1"/>
+              <a:t>banyak</a:t>
+            </a:r>
+            <a:r>
+              <a:rPr lang="en-US" sz="2000" dirty="0"/>
+              <a:t> </a:t>
+            </a:r>
+            <a:r>
+              <a:rPr lang="en-US" sz="2000" dirty="0" err="1"/>
+              <a:t>dan</a:t>
+            </a:r>
+            <a:r>
+              <a:rPr lang="en-US" sz="2000" dirty="0"/>
+              <a:t> </a:t>
+            </a:r>
+            <a:r>
+              <a:rPr lang="en-US" sz="2000" dirty="0" err="1"/>
+              <a:t>tidak</a:t>
+            </a:r>
+            <a:r>
+              <a:rPr lang="en-US" sz="2000" dirty="0"/>
+              <a:t> </a:t>
+            </a:r>
+            <a:r>
+              <a:rPr lang="en-US" sz="2000" dirty="0" err="1"/>
+              <a:t>hanya</a:t>
+            </a:r>
+            <a:r>
+              <a:rPr lang="en-US" sz="2000" dirty="0"/>
+              <a:t> </a:t>
+            </a:r>
+            <a:r>
+              <a:rPr lang="en-US" sz="2000" dirty="0" err="1"/>
+              <a:t>satu</a:t>
+            </a:r>
+            <a:r>
+              <a:rPr lang="en-US" sz="2000" dirty="0" smtClean="0"/>
+              <a:t>. </a:t>
+            </a:r>
+            <a:r>
+              <a:rPr lang="en-US" sz="2000" dirty="0" err="1" smtClean="0"/>
+              <a:t>Contohnya</a:t>
+            </a:r>
+            <a:r>
+              <a:rPr lang="en-US" sz="2000" dirty="0" smtClean="0"/>
+              <a:t> </a:t>
+            </a:r>
+            <a:r>
+              <a:rPr lang="en-US" sz="2000" dirty="0" err="1" smtClean="0"/>
+              <a:t>adalah</a:t>
+            </a:r>
+            <a:endParaRPr lang="en-US" sz="2000" dirty="0" smtClean="0"/>
+          </a:p>
+          <a:p>
+            <a:pPr marL="0" indent="0">
+              <a:buNone/>
+            </a:pPr>
+            <a:endParaRPr lang="en-US" sz="2000" dirty="0"/>
           </a:p>
         </p:txBody>
       </p:sp>
+      <p:pic>
+        <p:nvPicPr>
+          <p:cNvPr id="2050" name="Picture 2"/>
+          <p:cNvPicPr>
+            <a:picLocks noChangeAspect="1" noChangeArrowheads="1"/>
+          </p:cNvPicPr>
+          <p:nvPr/>
+        </p:nvPicPr>
+        <p:blipFill>
+          <a:blip r:embed="rId2">
+            <a:extLst>
+              <a:ext uri="{28A0092B-C50C-407E-A947-70E740481C1C}">
+                <a14:useLocalDpi xmlns:a14="http://schemas.microsoft.com/office/drawing/2010/main" val="0"/>
+              </a:ext>
+            </a:extLst>
+          </a:blip>
+          <a:srcRect/>
+          <a:stretch>
+            <a:fillRect/>
+          </a:stretch>
+        </p:blipFill>
+        <p:spPr bwMode="auto">
+          <a:xfrm>
+            <a:off x="2286000" y="3124200"/>
+            <a:ext cx="4942449" cy="2590800"/>
+          </a:xfrm>
+          <a:prstGeom prst="rect">
+            <a:avLst/>
+          </a:prstGeom>
+          <a:noFill/>
+          <a:ln>
+            <a:noFill/>
+          </a:ln>
+          <a:effectLst/>
+          <a:extLst>
+            <a:ext uri="{909E8E84-426E-40DD-AFC4-6F175D3DCCD1}">
+              <a14:hiddenFill xmlns:a14="http://schemas.microsoft.com/office/drawing/2010/main">
+                <a:solidFill>
+                  <a:schemeClr val="accent1"/>
+                </a:solidFill>
+              </a14:hiddenFill>
+            </a:ext>
+            <a:ext uri="{91240B29-F687-4F45-9708-019B960494DF}">
+              <a14:hiddenLine xmlns:a14="http://schemas.microsoft.com/office/drawing/2010/main" w="9525">
+                <a:solidFill>
+                  <a:schemeClr val="tx1"/>
+                </a:solidFill>
+                <a:miter lim="800000"/>
+                <a:headEnd/>
+                <a:tailEnd/>
+              </a14:hiddenLine>
+            </a:ext>
+            <a:ext uri="{AF507438-7753-43E0-B8FC-AC1667EBCBE1}">
+              <a14:hiddenEffects xmlns:a14="http://schemas.microsoft.com/office/drawing/2010/main">
+                <a:effectLst>
+                  <a:outerShdw dist="35921" dir="2700000" algn="ctr" rotWithShape="0">
+                    <a:schemeClr val="bg2"/>
+                  </a:outerShdw>
+                </a:effectLst>
+              </a14:hiddenEffects>
+            </a:ext>
+          </a:extLst>
+        </p:spPr>
+      </p:pic>
     </p:spTree>
     <p:extLst>
       <p:ext uri="{BB962C8B-B14F-4D97-AF65-F5344CB8AC3E}">
@@ -11257,6 +12313,13 @@
   <p:clrMapOvr>
     <a:masterClrMapping/>
   </p:clrMapOvr>
+  <p:timing>
+    <p:tnLst>
+      <p:par>
+        <p:cTn id="1" dur="indefinite" restart="never" nodeType="tmRoot"/>
+      </p:par>
+    </p:tnLst>
+  </p:timing>
 </p:sld>
 </file>
 
@@ -11292,7 +12355,24 @@
           <a:bodyPr/>
           <a:lstStyle/>
           <a:p>
-            <a:endParaRPr lang="en-US"/>
+            <a:pPr algn="l"/>
+            <a:r>
+              <a:rPr lang="en-US" dirty="0" err="1" smtClean="0"/>
+              <a:t>Fungsi</a:t>
+            </a:r>
+            <a:r>
+              <a:rPr lang="en-US" dirty="0" smtClean="0"/>
+              <a:t> </a:t>
+            </a:r>
+            <a:r>
+              <a:rPr lang="en-US" dirty="0" err="1" smtClean="0"/>
+              <a:t>Pada</a:t>
+            </a:r>
+            <a:r>
+              <a:rPr lang="en-US" dirty="0" smtClean="0"/>
+              <a:t> Python</a:t>
+            </a:r>
+            <a:endParaRPr lang="en-US" dirty="0"/>
           </a:p>
         </p:txBody>
       </p:sp>
@@ -11306,15 +12386,611 @@
             <p:ph idx="1"/>
           </p:nvPr>
         </p:nvSpPr>
-        <p:spPr/>
+        <p:spPr>
+          <a:xfrm>
+            <a:off x="0" y="1600200"/>
+            <a:ext cx="9144000" cy="5257800"/>
+          </a:xfrm>
+        </p:spPr>
         <p:txBody>
-          <a:bodyPr/>
+          <a:bodyPr>
+            <a:normAutofit/>
+          </a:bodyPr>
           <a:lstStyle/>
           <a:p>
-            <a:endParaRPr lang="en-US"/>
+            <a:pPr marL="0" indent="0">
+              <a:buNone/>
+            </a:pPr>
+            <a:r>
+              <a:rPr lang="en-US" sz="2000" dirty="0" err="1"/>
+              <a:t>Fungsi</a:t>
+            </a:r>
+            <a:r>
+              <a:rPr lang="en-US" sz="2000" dirty="0"/>
+              <a:t> </a:t>
+            </a:r>
+            <a:r>
+              <a:rPr lang="en-US" sz="2000" dirty="0" err="1"/>
+              <a:t>pada</a:t>
+            </a:r>
+            <a:r>
+              <a:rPr lang="en-US" sz="2000" dirty="0"/>
+              <a:t> Python, </a:t>
+            </a:r>
+            <a:r>
+              <a:rPr lang="en-US" sz="2000" dirty="0" err="1"/>
+              <a:t>dibuat</a:t>
+            </a:r>
+            <a:r>
+              <a:rPr lang="en-US" sz="2000" dirty="0"/>
+              <a:t> </a:t>
+            </a:r>
+            <a:r>
+              <a:rPr lang="en-US" sz="2000" dirty="0" err="1"/>
+              <a:t>dengan</a:t>
+            </a:r>
+            <a:r>
+              <a:rPr lang="en-US" sz="2000" dirty="0"/>
+              <a:t> kata </a:t>
+            </a:r>
+            <a:r>
+              <a:rPr lang="en-US" sz="2000" dirty="0" err="1"/>
+              <a:t>kunci</a:t>
+            </a:r>
+            <a:r>
+              <a:rPr lang="en-US" sz="2000" dirty="0"/>
+              <a:t> </a:t>
+            </a:r>
+            <a:r>
+              <a:rPr lang="en-US" sz="2000" dirty="0" err="1"/>
+              <a:t>def</a:t>
+            </a:r>
+            <a:r>
+              <a:rPr lang="en-US" sz="2000" dirty="0"/>
+              <a:t> </a:t>
+            </a:r>
+            <a:r>
+              <a:rPr lang="en-US" sz="2000" dirty="0" err="1"/>
+              <a:t>kemudian</a:t>
+            </a:r>
+            <a:r>
+              <a:rPr lang="en-US" sz="2000" dirty="0"/>
+              <a:t> </a:t>
+            </a:r>
+            <a:r>
+              <a:rPr lang="en-US" sz="2000" dirty="0" err="1"/>
+              <a:t>diikuti</a:t>
+            </a:r>
+            <a:r>
+              <a:rPr lang="en-US" sz="2000" dirty="0"/>
+              <a:t> </a:t>
+            </a:r>
+            <a:r>
+              <a:rPr lang="en-US" sz="2000" dirty="0" err="1"/>
+              <a:t>dengan</a:t>
+            </a:r>
+            <a:r>
+              <a:rPr lang="en-US" sz="2000" dirty="0"/>
+              <a:t> </a:t>
+            </a:r>
+            <a:r>
+              <a:rPr lang="en-US" sz="2000" dirty="0" err="1"/>
+              <a:t>nama</a:t>
+            </a:r>
+            <a:r>
+              <a:rPr lang="en-US" sz="2000" dirty="0"/>
+              <a:t> </a:t>
+            </a:r>
+            <a:r>
+              <a:rPr lang="en-US" sz="2000" dirty="0" err="1"/>
+              <a:t>fungsinya</a:t>
+            </a:r>
+            <a:r>
+              <a:rPr lang="en-US" sz="2000" dirty="0" smtClean="0"/>
+              <a:t>. </a:t>
+            </a:r>
+            <a:r>
+              <a:rPr lang="en-US" sz="2000" dirty="0" err="1" smtClean="0"/>
+              <a:t>Untuk</a:t>
+            </a:r>
+            <a:r>
+              <a:rPr lang="en-US" sz="2000" dirty="0" smtClean="0"/>
+              <a:t> </a:t>
+            </a:r>
+            <a:r>
+              <a:rPr lang="en-US" sz="2000" dirty="0" err="1" smtClean="0"/>
+              <a:t>memanggil</a:t>
+            </a:r>
+            <a:r>
+              <a:rPr lang="en-US" sz="2000" dirty="0" smtClean="0"/>
+              <a:t> </a:t>
+            </a:r>
+            <a:r>
+              <a:rPr lang="en-US" sz="2000" dirty="0" err="1" smtClean="0"/>
+              <a:t>fungsinya</a:t>
+            </a:r>
+            <a:r>
+              <a:rPr lang="en-US" sz="2000" dirty="0" smtClean="0"/>
+              <a:t> </a:t>
+            </a:r>
+            <a:r>
+              <a:rPr lang="en-US" sz="2000" dirty="0" err="1" smtClean="0"/>
+              <a:t>kita</a:t>
+            </a:r>
+            <a:r>
+              <a:rPr lang="en-US" sz="2000" dirty="0" smtClean="0"/>
+              <a:t> </a:t>
+            </a:r>
+            <a:r>
+              <a:rPr lang="en-US" sz="2000" dirty="0" err="1" smtClean="0"/>
+              <a:t>hanya</a:t>
+            </a:r>
+            <a:r>
+              <a:rPr lang="en-US" sz="2000" dirty="0" smtClean="0"/>
+              <a:t> </a:t>
+            </a:r>
+            <a:r>
+              <a:rPr lang="en-US" sz="2000" dirty="0" err="1" smtClean="0"/>
+              <a:t>perlu</a:t>
+            </a:r>
+            <a:r>
+              <a:rPr lang="en-US" sz="2000" dirty="0" smtClean="0"/>
+              <a:t> </a:t>
+            </a:r>
+            <a:r>
+              <a:rPr lang="en-US" sz="2000" dirty="0" err="1" smtClean="0"/>
+              <a:t>memanggil</a:t>
+            </a:r>
+            <a:r>
+              <a:rPr lang="en-US" sz="2000" dirty="0" smtClean="0"/>
+              <a:t> </a:t>
+            </a:r>
+            <a:r>
+              <a:rPr lang="en-US" sz="2000" dirty="0" err="1" smtClean="0"/>
+              <a:t>nama</a:t>
+            </a:r>
+            <a:r>
+              <a:rPr lang="en-US" sz="2000" dirty="0" smtClean="0"/>
+              <a:t> </a:t>
+            </a:r>
+            <a:r>
+              <a:rPr lang="en-US" sz="2000" dirty="0" err="1" smtClean="0"/>
+              <a:t>fungsinya</a:t>
+            </a:r>
+            <a:r>
+              <a:rPr lang="en-US" sz="2000" dirty="0" smtClean="0"/>
+              <a:t>. </a:t>
+            </a:r>
+            <a:r>
+              <a:rPr lang="en-US" sz="2000" dirty="0" err="1" smtClean="0"/>
+              <a:t>Contohnya</a:t>
+            </a:r>
+            <a:r>
+              <a:rPr lang="en-US" sz="2000" dirty="0" smtClean="0"/>
+              <a:t> : </a:t>
+            </a:r>
+          </a:p>
+          <a:p>
+            <a:pPr marL="0" indent="0">
+              <a:buNone/>
+            </a:pPr>
+            <a:endParaRPr lang="en-US" sz="2000" dirty="0"/>
+          </a:p>
+          <a:p>
+            <a:pPr marL="0" indent="0">
+              <a:buNone/>
+            </a:pPr>
+            <a:endParaRPr lang="en-US" sz="2000" dirty="0" smtClean="0"/>
+          </a:p>
+          <a:p>
+            <a:pPr marL="0" indent="0">
+              <a:buNone/>
+            </a:pPr>
+            <a:endParaRPr lang="en-US" sz="2000" dirty="0"/>
+          </a:p>
+          <a:p>
+            <a:pPr marL="0" indent="0">
+              <a:buNone/>
+            </a:pPr>
+            <a:endParaRPr lang="en-US" sz="2000" dirty="0" smtClean="0"/>
+          </a:p>
+          <a:p>
+            <a:pPr marL="0" indent="0">
+              <a:buNone/>
+            </a:pPr>
+            <a:r>
+              <a:rPr lang="en-US" sz="2000" dirty="0" err="1" smtClean="0"/>
+              <a:t>Pada</a:t>
+            </a:r>
+            <a:r>
+              <a:rPr lang="en-US" sz="2000" dirty="0" smtClean="0"/>
+              <a:t> Python, </a:t>
+            </a:r>
+            <a:r>
+              <a:rPr lang="en-US" sz="2000" dirty="0" err="1" smtClean="0"/>
+              <a:t>sebuah</a:t>
+            </a:r>
+            <a:r>
+              <a:rPr lang="en-US" sz="2000" dirty="0" smtClean="0"/>
+              <a:t> </a:t>
+            </a:r>
+            <a:r>
+              <a:rPr lang="en-US" sz="2000" dirty="0" err="1" smtClean="0"/>
+              <a:t>fungsi</a:t>
+            </a:r>
+            <a:r>
+              <a:rPr lang="en-US" sz="2000" dirty="0" smtClean="0"/>
+              <a:t> </a:t>
+            </a:r>
+            <a:r>
+              <a:rPr lang="en-US" sz="2000" dirty="0" err="1" smtClean="0"/>
+              <a:t>dapat</a:t>
+            </a:r>
+            <a:r>
+              <a:rPr lang="en-US" sz="2000" dirty="0" smtClean="0"/>
+              <a:t> </a:t>
+            </a:r>
+            <a:r>
+              <a:rPr lang="en-US" sz="2000" dirty="0" err="1" smtClean="0"/>
+              <a:t>memiliki</a:t>
+            </a:r>
+            <a:r>
+              <a:rPr lang="en-US" sz="2000" dirty="0" smtClean="0"/>
+              <a:t> parameter</a:t>
+            </a:r>
+            <a:r>
+              <a:rPr lang="en-US" sz="2000" dirty="0"/>
+              <a:t>, </a:t>
+            </a:r>
+            <a:r>
+              <a:rPr lang="en-US" sz="2000" dirty="0" smtClean="0"/>
+              <a:t>parameter </a:t>
+            </a:r>
+            <a:r>
+              <a:rPr lang="en-US" sz="2000" dirty="0" err="1"/>
+              <a:t>adalah</a:t>
+            </a:r>
+            <a:r>
+              <a:rPr lang="en-US" sz="2000" dirty="0"/>
+              <a:t> </a:t>
+            </a:r>
+            <a:r>
+              <a:rPr lang="en-US" sz="2000" dirty="0" err="1"/>
+              <a:t>variabel</a:t>
+            </a:r>
+            <a:r>
+              <a:rPr lang="en-US" sz="2000" dirty="0"/>
+              <a:t> yang </a:t>
+            </a:r>
+            <a:r>
+              <a:rPr lang="en-US" sz="2000" dirty="0" err="1"/>
+              <a:t>menampung</a:t>
+            </a:r>
+            <a:r>
+              <a:rPr lang="en-US" sz="2000" dirty="0"/>
+              <a:t> </a:t>
+            </a:r>
+            <a:r>
+              <a:rPr lang="en-US" sz="2000" dirty="0" err="1"/>
+              <a:t>nilai</a:t>
+            </a:r>
+            <a:r>
+              <a:rPr lang="en-US" sz="2000" dirty="0"/>
+              <a:t> </a:t>
+            </a:r>
+            <a:r>
+              <a:rPr lang="en-US" sz="2000" dirty="0" err="1"/>
+              <a:t>untuk</a:t>
+            </a:r>
+            <a:r>
+              <a:rPr lang="en-US" sz="2000" dirty="0"/>
+              <a:t> </a:t>
+            </a:r>
+            <a:r>
+              <a:rPr lang="en-US" sz="2000" dirty="0" err="1"/>
+              <a:t>diproses</a:t>
+            </a:r>
+            <a:r>
+              <a:rPr lang="en-US" sz="2000" dirty="0"/>
+              <a:t> di </a:t>
+            </a:r>
+            <a:r>
+              <a:rPr lang="en-US" sz="2000" dirty="0" err="1"/>
+              <a:t>dalam</a:t>
+            </a:r>
+            <a:r>
+              <a:rPr lang="en-US" sz="2000" dirty="0"/>
+              <a:t> </a:t>
+            </a:r>
+            <a:r>
+              <a:rPr lang="en-US" sz="2000" dirty="0" err="1"/>
+              <a:t>fungsi</a:t>
+            </a:r>
+            <a:r>
+              <a:rPr lang="en-US" sz="2000" dirty="0" smtClean="0"/>
+              <a:t>. Parameter </a:t>
+            </a:r>
+            <a:r>
+              <a:rPr lang="en-US" sz="2000" dirty="0" err="1" smtClean="0"/>
+              <a:t>ini</a:t>
+            </a:r>
+            <a:r>
+              <a:rPr lang="en-US" sz="2000" dirty="0"/>
+              <a:t> </a:t>
+            </a:r>
+            <a:r>
+              <a:rPr lang="en-US" sz="2000" dirty="0" err="1" smtClean="0"/>
+              <a:t>diletakkan</a:t>
+            </a:r>
+            <a:r>
+              <a:rPr lang="en-US" sz="2000" dirty="0" smtClean="0"/>
+              <a:t> di </a:t>
+            </a:r>
+            <a:r>
+              <a:rPr lang="en-US" sz="2000" dirty="0" err="1" smtClean="0"/>
+              <a:t>dalam</a:t>
+            </a:r>
+            <a:r>
+              <a:rPr lang="en-US" sz="2000" dirty="0" smtClean="0"/>
+              <a:t> </a:t>
+            </a:r>
+            <a:r>
+              <a:rPr lang="en-US" sz="2000" dirty="0" err="1" smtClean="0"/>
+              <a:t>tanda</a:t>
+            </a:r>
+            <a:r>
+              <a:rPr lang="en-US" sz="2000" dirty="0" smtClean="0"/>
+              <a:t> </a:t>
+            </a:r>
+            <a:r>
+              <a:rPr lang="en-US" sz="2000" dirty="0" err="1" smtClean="0"/>
+              <a:t>kurung</a:t>
+            </a:r>
+            <a:r>
+              <a:rPr lang="en-US" sz="2000" dirty="0" smtClean="0"/>
+              <a:t>. Parameter </a:t>
+            </a:r>
+            <a:r>
+              <a:rPr lang="en-US" sz="2000" dirty="0" err="1" smtClean="0"/>
+              <a:t>ini</a:t>
+            </a:r>
+            <a:r>
+              <a:rPr lang="en-US" sz="2000" dirty="0" smtClean="0"/>
+              <a:t> </a:t>
+            </a:r>
+            <a:r>
+              <a:rPr lang="en-US" sz="2000" dirty="0" err="1" smtClean="0"/>
+              <a:t>bisa</a:t>
+            </a:r>
+            <a:r>
+              <a:rPr lang="en-US" sz="2000" dirty="0" smtClean="0"/>
+              <a:t> di </a:t>
+            </a:r>
+            <a:r>
+              <a:rPr lang="en-US" sz="2000" dirty="0" err="1" smtClean="0"/>
+              <a:t>isi</a:t>
+            </a:r>
+            <a:r>
+              <a:rPr lang="en-US" sz="2000" dirty="0" smtClean="0"/>
+              <a:t> 1 </a:t>
+            </a:r>
+            <a:r>
+              <a:rPr lang="en-US" sz="2000" dirty="0" err="1" smtClean="0"/>
+              <a:t>atau</a:t>
+            </a:r>
+            <a:r>
+              <a:rPr lang="en-US" sz="2000" dirty="0" smtClean="0"/>
+              <a:t> </a:t>
+            </a:r>
+            <a:r>
+              <a:rPr lang="en-US" sz="2000" dirty="0" err="1" smtClean="0"/>
+              <a:t>lebih</a:t>
+            </a:r>
+            <a:r>
+              <a:rPr lang="en-US" sz="2000" dirty="0" smtClean="0"/>
+              <a:t> </a:t>
+            </a:r>
+            <a:r>
+              <a:rPr lang="en-US" sz="2000" dirty="0" err="1" smtClean="0"/>
+              <a:t>dan</a:t>
+            </a:r>
+            <a:r>
+              <a:rPr lang="en-US" sz="2000" dirty="0" smtClean="0"/>
+              <a:t> </a:t>
+            </a:r>
+            <a:r>
+              <a:rPr lang="en-US" sz="2000" dirty="0" err="1" smtClean="0"/>
+              <a:t>pemisahnya</a:t>
+            </a:r>
+            <a:r>
+              <a:rPr lang="en-US" sz="2000" dirty="0" smtClean="0"/>
+              <a:t> </a:t>
+            </a:r>
+            <a:r>
+              <a:rPr lang="en-US" sz="2000" dirty="0" err="1" smtClean="0"/>
+              <a:t>adalah</a:t>
+            </a:r>
+            <a:r>
+              <a:rPr lang="en-US" sz="2000" dirty="0" smtClean="0"/>
+              <a:t> </a:t>
+            </a:r>
+            <a:r>
+              <a:rPr lang="en-US" sz="2000" dirty="0" err="1" smtClean="0"/>
+              <a:t>tanda</a:t>
+            </a:r>
+            <a:r>
+              <a:rPr lang="en-US" sz="2000" dirty="0" smtClean="0"/>
+              <a:t> </a:t>
+            </a:r>
+            <a:r>
+              <a:rPr lang="en-US" sz="2000" dirty="0" err="1" smtClean="0"/>
+              <a:t>koma</a:t>
+            </a:r>
+            <a:r>
+              <a:rPr lang="en-US" sz="2000" dirty="0" smtClean="0"/>
+              <a:t>. </a:t>
+            </a:r>
+            <a:r>
+              <a:rPr lang="en-US" sz="2000" dirty="0" err="1" smtClean="0"/>
+              <a:t>Berikut</a:t>
+            </a:r>
+            <a:r>
+              <a:rPr lang="en-US" sz="2000" dirty="0" smtClean="0"/>
+              <a:t> </a:t>
+            </a:r>
+            <a:r>
+              <a:rPr lang="en-US" sz="2000" dirty="0" err="1" smtClean="0"/>
+              <a:t>adalah</a:t>
+            </a:r>
+            <a:r>
+              <a:rPr lang="en-US" sz="2000" dirty="0" smtClean="0"/>
+              <a:t> </a:t>
+            </a:r>
+            <a:r>
+              <a:rPr lang="en-US" sz="2000" dirty="0" err="1" smtClean="0"/>
+              <a:t>contohnya</a:t>
+            </a:r>
+            <a:r>
+              <a:rPr lang="en-US" sz="2000" dirty="0" smtClean="0"/>
+              <a:t> :</a:t>
+            </a:r>
+          </a:p>
+          <a:p>
+            <a:pPr marL="0" indent="0">
+              <a:buNone/>
+            </a:pPr>
+            <a:endParaRPr lang="en-US" sz="2000" dirty="0"/>
           </a:p>
         </p:txBody>
       </p:sp>
+      <p:pic>
+        <p:nvPicPr>
+          <p:cNvPr id="3074" name="Picture 2"/>
+          <p:cNvPicPr>
+            <a:picLocks noChangeAspect="1" noChangeArrowheads="1"/>
+          </p:cNvPicPr>
+          <p:nvPr/>
+        </p:nvPicPr>
+        <p:blipFill>
+          <a:blip r:embed="rId2">
+            <a:extLst>
+              <a:ext uri="{28A0092B-C50C-407E-A947-70E740481C1C}">
+                <a14:useLocalDpi xmlns:a14="http://schemas.microsoft.com/office/drawing/2010/main" val="0"/>
+              </a:ext>
+            </a:extLst>
+          </a:blip>
+          <a:srcRect/>
+          <a:stretch>
+            <a:fillRect/>
+          </a:stretch>
+        </p:blipFill>
+        <p:spPr bwMode="auto">
+          <a:xfrm>
+            <a:off x="2590800" y="2427576"/>
+            <a:ext cx="3578165" cy="1724025"/>
+          </a:xfrm>
+          <a:prstGeom prst="rect">
+            <a:avLst/>
+          </a:prstGeom>
+          <a:noFill/>
+          <a:ln>
+            <a:noFill/>
+          </a:ln>
+          <a:effectLst/>
+          <a:extLst>
+            <a:ext uri="{909E8E84-426E-40DD-AFC4-6F175D3DCCD1}">
+              <a14:hiddenFill xmlns:a14="http://schemas.microsoft.com/office/drawing/2010/main">
+                <a:solidFill>
+                  <a:schemeClr val="accent1"/>
+                </a:solidFill>
+              </a14:hiddenFill>
+            </a:ext>
+            <a:ext uri="{91240B29-F687-4F45-9708-019B960494DF}">
+              <a14:hiddenLine xmlns:a14="http://schemas.microsoft.com/office/drawing/2010/main" w="9525">
+                <a:solidFill>
+                  <a:schemeClr val="tx1"/>
+                </a:solidFill>
+                <a:miter lim="800000"/>
+                <a:headEnd/>
+                <a:tailEnd/>
+              </a14:hiddenLine>
+            </a:ext>
+            <a:ext uri="{AF507438-7753-43E0-B8FC-AC1667EBCBE1}">
+              <a14:hiddenEffects xmlns:a14="http://schemas.microsoft.com/office/drawing/2010/main">
+                <a:effectLst>
+                  <a:outerShdw dist="35921" dir="2700000" algn="ctr" rotWithShape="0">
+                    <a:schemeClr val="bg2"/>
+                  </a:outerShdw>
+                </a:effectLst>
+              </a14:hiddenEffects>
+            </a:ext>
+          </a:extLst>
+        </p:spPr>
+      </p:pic>
+      <p:pic>
+        <p:nvPicPr>
+          <p:cNvPr id="3075" name="Picture 3"/>
+          <p:cNvPicPr>
+            <a:picLocks noChangeAspect="1" noChangeArrowheads="1"/>
+          </p:cNvPicPr>
+          <p:nvPr/>
+        </p:nvPicPr>
+        <p:blipFill>
+          <a:blip r:embed="rId3">
+            <a:extLst>
+              <a:ext uri="{28A0092B-C50C-407E-A947-70E740481C1C}">
+                <a14:useLocalDpi xmlns:a14="http://schemas.microsoft.com/office/drawing/2010/main" val="0"/>
+              </a:ext>
+            </a:extLst>
+          </a:blip>
+          <a:srcRect/>
+          <a:stretch>
+            <a:fillRect/>
+          </a:stretch>
+        </p:blipFill>
+        <p:spPr bwMode="auto">
+          <a:xfrm>
+            <a:off x="3962400" y="5105400"/>
+            <a:ext cx="4011283" cy="1524000"/>
+          </a:xfrm>
+          <a:prstGeom prst="rect">
+            <a:avLst/>
+          </a:prstGeom>
+          <a:noFill/>
+          <a:ln>
+            <a:noFill/>
+          </a:ln>
+          <a:effectLst/>
+          <a:extLst>
+            <a:ext uri="{909E8E84-426E-40DD-AFC4-6F175D3DCCD1}">
+              <a14:hiddenFill xmlns:a14="http://schemas.microsoft.com/office/drawing/2010/main">
+                <a:solidFill>
+                  <a:schemeClr val="accent1"/>
+                </a:solidFill>
+              </a14:hiddenFill>
+            </a:ext>
+            <a:ext uri="{91240B29-F687-4F45-9708-019B960494DF}">
+              <a14:hiddenLine xmlns:a14="http://schemas.microsoft.com/office/drawing/2010/main" w="9525">
+                <a:solidFill>
+                  <a:schemeClr val="tx1"/>
+                </a:solidFill>
+                <a:miter lim="800000"/>
+                <a:headEnd/>
+                <a:tailEnd/>
+              </a14:hiddenLine>
+            </a:ext>
+            <a:ext uri="{AF507438-7753-43E0-B8FC-AC1667EBCBE1}">
+              <a14:hiddenEffects xmlns:a14="http://schemas.microsoft.com/office/drawing/2010/main">
+                <a:effectLst>
+                  <a:outerShdw dist="35921" dir="2700000" algn="ctr" rotWithShape="0">
+                    <a:schemeClr val="bg2"/>
+                  </a:outerShdw>
+                </a:effectLst>
+              </a14:hiddenEffects>
+            </a:ext>
+          </a:extLst>
+        </p:spPr>
+      </p:pic>
     </p:spTree>
     <p:extLst>
       <p:ext uri="{BB962C8B-B14F-4D97-AF65-F5344CB8AC3E}">
@@ -11325,6 +13001,13 @@
   <p:clrMapOvr>
     <a:masterClrMapping/>
   </p:clrMapOvr>
+  <p:timing>
+    <p:tnLst>
+      <p:par>
+        <p:cTn id="1" dur="indefinite" restart="never" nodeType="tmRoot"/>
+      </p:par>
+    </p:tnLst>
+  </p:timing>
 </p:sld>
 </file>
 
@@ -11360,7 +13043,24 @@
           <a:bodyPr/>
           <a:lstStyle/>
           <a:p>
-            <a:endParaRPr lang="en-US"/>
+            <a:pPr algn="l"/>
+            <a:r>
+              <a:rPr lang="en-US" dirty="0" err="1"/>
+              <a:t>Fungsi</a:t>
+            </a:r>
+            <a:r>
+              <a:rPr lang="en-US" dirty="0"/>
+              <a:t> </a:t>
+            </a:r>
+            <a:r>
+              <a:rPr lang="en-US" dirty="0" err="1"/>
+              <a:t>Pada</a:t>
+            </a:r>
+            <a:r>
+              <a:rPr lang="en-US" dirty="0"/>
+              <a:t> Python</a:t>
+            </a:r>
+            <a:endParaRPr lang="en-US" dirty="0"/>
           </a:p>
         </p:txBody>
       </p:sp>
@@ -11374,15 +13074,414 @@
             <p:ph idx="1"/>
           </p:nvPr>
         </p:nvSpPr>
-        <p:spPr/>
+        <p:spPr>
+          <a:xfrm>
+            <a:off x="0" y="1600200"/>
+            <a:ext cx="9144000" cy="5257800"/>
+          </a:xfrm>
+        </p:spPr>
         <p:txBody>
-          <a:bodyPr/>
+          <a:bodyPr>
+            <a:normAutofit/>
+          </a:bodyPr>
           <a:lstStyle/>
           <a:p>
-            <a:endParaRPr lang="en-US"/>
+            <a:pPr marL="0" indent="0">
+              <a:buNone/>
+            </a:pPr>
+            <a:r>
+              <a:rPr lang="en-US" sz="2000" dirty="0" err="1"/>
+              <a:t>Fungsi</a:t>
+            </a:r>
+            <a:r>
+              <a:rPr lang="en-US" sz="2000" dirty="0"/>
+              <a:t> yang </a:t>
+            </a:r>
+            <a:r>
+              <a:rPr lang="en-US" sz="2000" dirty="0" err="1"/>
+              <a:t>tidak</a:t>
+            </a:r>
+            <a:r>
+              <a:rPr lang="en-US" sz="2000" dirty="0"/>
+              <a:t> </a:t>
+            </a:r>
+            <a:r>
+              <a:rPr lang="en-US" sz="2000" dirty="0" err="1"/>
+              <a:t>mengembalikan</a:t>
+            </a:r>
+            <a:r>
+              <a:rPr lang="en-US" sz="2000" dirty="0"/>
+              <a:t> </a:t>
+            </a:r>
+            <a:r>
+              <a:rPr lang="en-US" sz="2000" dirty="0" err="1"/>
+              <a:t>nilai</a:t>
+            </a:r>
+            <a:r>
+              <a:rPr lang="en-US" sz="2000" dirty="0"/>
+              <a:t> </a:t>
+            </a:r>
+            <a:r>
+              <a:rPr lang="en-US" sz="2000" dirty="0" err="1"/>
+              <a:t>biasanya</a:t>
+            </a:r>
+            <a:r>
+              <a:rPr lang="en-US" sz="2000" dirty="0"/>
+              <a:t> </a:t>
+            </a:r>
+            <a:r>
+              <a:rPr lang="en-US" sz="2000" dirty="0" err="1"/>
+              <a:t>disebut</a:t>
+            </a:r>
+            <a:r>
+              <a:rPr lang="en-US" sz="2000" dirty="0"/>
+              <a:t> </a:t>
+            </a:r>
+            <a:r>
+              <a:rPr lang="en-US" sz="2000" dirty="0" err="1"/>
+              <a:t>dengan</a:t>
+            </a:r>
+            <a:r>
+              <a:rPr lang="en-US" sz="2000" dirty="0"/>
+              <a:t> </a:t>
+            </a:r>
+            <a:r>
+              <a:rPr lang="en-US" sz="2000" dirty="0" err="1" smtClean="0"/>
+              <a:t>prosedur</a:t>
+            </a:r>
+            <a:r>
+              <a:rPr lang="en-US" sz="2000" dirty="0" smtClean="0"/>
+              <a:t>. </a:t>
+            </a:r>
+            <a:r>
+              <a:rPr lang="en-US" sz="2000" dirty="0" err="1" smtClean="0"/>
+              <a:t>Namun</a:t>
+            </a:r>
+            <a:r>
+              <a:rPr lang="en-US" sz="2000" dirty="0"/>
+              <a:t>, </a:t>
+            </a:r>
+            <a:r>
+              <a:rPr lang="en-US" sz="2000" dirty="0" err="1"/>
+              <a:t>kadang</a:t>
+            </a:r>
+            <a:r>
+              <a:rPr lang="en-US" sz="2000" dirty="0"/>
+              <a:t> </a:t>
+            </a:r>
+            <a:r>
+              <a:rPr lang="en-US" sz="2000" dirty="0" err="1"/>
+              <a:t>kita</a:t>
+            </a:r>
+            <a:r>
+              <a:rPr lang="en-US" sz="2000" dirty="0"/>
+              <a:t> </a:t>
+            </a:r>
+            <a:r>
+              <a:rPr lang="en-US" sz="2000" dirty="0" err="1"/>
+              <a:t>butuh</a:t>
+            </a:r>
+            <a:r>
+              <a:rPr lang="en-US" sz="2000" dirty="0"/>
+              <a:t> </a:t>
+            </a:r>
+            <a:r>
+              <a:rPr lang="en-US" sz="2000" dirty="0" err="1"/>
+              <a:t>hasil</a:t>
+            </a:r>
+            <a:r>
+              <a:rPr lang="en-US" sz="2000" dirty="0"/>
+              <a:t> proses </a:t>
+            </a:r>
+            <a:r>
+              <a:rPr lang="en-US" sz="2000" dirty="0" err="1"/>
+              <a:t>dari</a:t>
+            </a:r>
+            <a:r>
+              <a:rPr lang="en-US" sz="2000" dirty="0"/>
+              <a:t> </a:t>
+            </a:r>
+            <a:r>
+              <a:rPr lang="en-US" sz="2000" dirty="0" err="1"/>
+              <a:t>fungsi</a:t>
+            </a:r>
+            <a:r>
+              <a:rPr lang="en-US" sz="2000" dirty="0"/>
+              <a:t> </a:t>
+            </a:r>
+            <a:r>
+              <a:rPr lang="en-US" sz="2000" dirty="0" err="1"/>
+              <a:t>untuk</a:t>
+            </a:r>
+            <a:r>
+              <a:rPr lang="en-US" sz="2000" dirty="0"/>
+              <a:t> </a:t>
+            </a:r>
+            <a:r>
+              <a:rPr lang="en-US" sz="2000" dirty="0" err="1"/>
+              <a:t>digunakan</a:t>
+            </a:r>
+            <a:r>
+              <a:rPr lang="en-US" sz="2000" dirty="0"/>
+              <a:t> </a:t>
+            </a:r>
+            <a:r>
+              <a:rPr lang="en-US" sz="2000" dirty="0" err="1"/>
+              <a:t>pada</a:t>
+            </a:r>
+            <a:r>
+              <a:rPr lang="en-US" sz="2000" dirty="0"/>
+              <a:t> proses </a:t>
+            </a:r>
+            <a:r>
+              <a:rPr lang="en-US" sz="2000" dirty="0" err="1" smtClean="0"/>
+              <a:t>berikutnya</a:t>
+            </a:r>
+            <a:r>
+              <a:rPr lang="en-US" sz="2000" dirty="0" smtClean="0"/>
+              <a:t>. </a:t>
+            </a:r>
+            <a:r>
+              <a:rPr lang="en-US" sz="2000" dirty="0" err="1" smtClean="0"/>
+              <a:t>Maka</a:t>
+            </a:r>
+            <a:r>
+              <a:rPr lang="en-US" sz="2000" dirty="0" smtClean="0"/>
+              <a:t> </a:t>
+            </a:r>
+            <a:r>
+              <a:rPr lang="en-US" sz="2000" dirty="0" err="1"/>
+              <a:t>fungsi</a:t>
+            </a:r>
+            <a:r>
+              <a:rPr lang="en-US" sz="2000" dirty="0"/>
+              <a:t> </a:t>
+            </a:r>
+            <a:r>
+              <a:rPr lang="en-US" sz="2000" dirty="0" err="1"/>
+              <a:t>harus</a:t>
+            </a:r>
+            <a:r>
+              <a:rPr lang="en-US" sz="2000" dirty="0"/>
+              <a:t> </a:t>
+            </a:r>
+            <a:r>
+              <a:rPr lang="en-US" sz="2000" dirty="0" err="1"/>
+              <a:t>mengembalikan</a:t>
+            </a:r>
+            <a:r>
+              <a:rPr lang="en-US" sz="2000" dirty="0"/>
+              <a:t> </a:t>
+            </a:r>
+            <a:r>
+              <a:rPr lang="en-US" sz="2000" dirty="0" err="1"/>
+              <a:t>nilai</a:t>
+            </a:r>
+            <a:r>
+              <a:rPr lang="en-US" sz="2000" dirty="0"/>
+              <a:t> </a:t>
+            </a:r>
+            <a:r>
+              <a:rPr lang="en-US" sz="2000" dirty="0" err="1"/>
+              <a:t>dari</a:t>
+            </a:r>
+            <a:r>
+              <a:rPr lang="en-US" sz="2000" dirty="0"/>
+              <a:t> </a:t>
+            </a:r>
+            <a:r>
+              <a:rPr lang="en-US" sz="2000" dirty="0" err="1"/>
+              <a:t>hasil</a:t>
+            </a:r>
+            <a:r>
+              <a:rPr lang="en-US" sz="2000" dirty="0"/>
+              <a:t> </a:t>
+            </a:r>
+            <a:r>
+              <a:rPr lang="en-US" sz="2000" dirty="0" err="1" smtClean="0"/>
+              <a:t>pemrosesannya</a:t>
+            </a:r>
+            <a:r>
+              <a:rPr lang="en-US" sz="2000" dirty="0" smtClean="0"/>
+              <a:t>. Cara </a:t>
+            </a:r>
+            <a:r>
+              <a:rPr lang="en-US" sz="2000" dirty="0" err="1" smtClean="0"/>
+              <a:t>mengembalikan</a:t>
+            </a:r>
+            <a:r>
+              <a:rPr lang="en-US" sz="2000" dirty="0" smtClean="0"/>
+              <a:t> </a:t>
+            </a:r>
+            <a:r>
+              <a:rPr lang="en-US" sz="2000" dirty="0" err="1"/>
+              <a:t>nilai</a:t>
+            </a:r>
+            <a:r>
+              <a:rPr lang="en-US" sz="2000" dirty="0"/>
+              <a:t> </a:t>
+            </a:r>
+            <a:r>
+              <a:rPr lang="en-US" sz="2000" dirty="0" err="1"/>
+              <a:t>adalah</a:t>
+            </a:r>
+            <a:r>
+              <a:rPr lang="en-US" sz="2000" dirty="0"/>
+              <a:t> </a:t>
+            </a:r>
+            <a:r>
+              <a:rPr lang="en-US" sz="2000" dirty="0" err="1"/>
+              <a:t>menggunkan</a:t>
+            </a:r>
+            <a:r>
+              <a:rPr lang="en-US" sz="2000" dirty="0"/>
+              <a:t> kata </a:t>
+            </a:r>
+            <a:r>
+              <a:rPr lang="en-US" sz="2000" dirty="0" err="1"/>
+              <a:t>kunci</a:t>
+            </a:r>
+            <a:r>
+              <a:rPr lang="en-US" sz="2000" dirty="0"/>
+              <a:t> return </a:t>
+            </a:r>
+            <a:r>
+              <a:rPr lang="en-US" sz="2000" dirty="0" err="1"/>
+              <a:t>lalu</a:t>
+            </a:r>
+            <a:r>
+              <a:rPr lang="en-US" sz="2000" dirty="0"/>
+              <a:t> </a:t>
+            </a:r>
+            <a:r>
+              <a:rPr lang="en-US" sz="2000" dirty="0" err="1"/>
+              <a:t>diikuti</a:t>
+            </a:r>
+            <a:r>
+              <a:rPr lang="en-US" sz="2000" dirty="0"/>
+              <a:t> </a:t>
+            </a:r>
+            <a:r>
+              <a:rPr lang="en-US" sz="2000" dirty="0" err="1"/>
+              <a:t>dengan</a:t>
+            </a:r>
+            <a:r>
+              <a:rPr lang="en-US" sz="2000" dirty="0"/>
+              <a:t> </a:t>
+            </a:r>
+            <a:r>
+              <a:rPr lang="en-US" sz="2000" dirty="0" err="1"/>
+              <a:t>nilai</a:t>
+            </a:r>
+            <a:r>
+              <a:rPr lang="en-US" sz="2000" dirty="0"/>
+              <a:t> </a:t>
+            </a:r>
+            <a:r>
+              <a:rPr lang="en-US" sz="2000" dirty="0" err="1"/>
+              <a:t>atau</a:t>
+            </a:r>
+            <a:r>
+              <a:rPr lang="en-US" sz="2000" dirty="0"/>
+              <a:t> </a:t>
+            </a:r>
+            <a:r>
+              <a:rPr lang="en-US" sz="2000" dirty="0" err="1"/>
+              <a:t>variabel</a:t>
+            </a:r>
+            <a:r>
+              <a:rPr lang="en-US" sz="2000" dirty="0"/>
+              <a:t> yang </a:t>
+            </a:r>
+            <a:r>
+              <a:rPr lang="en-US" sz="2000" dirty="0" err="1"/>
+              <a:t>akan</a:t>
+            </a:r>
+            <a:r>
+              <a:rPr lang="en-US" sz="2000" dirty="0"/>
+              <a:t> </a:t>
+            </a:r>
+            <a:r>
+              <a:rPr lang="en-US" sz="2000" dirty="0" err="1"/>
+              <a:t>dikembalikan</a:t>
+            </a:r>
+            <a:r>
+              <a:rPr lang="en-US" sz="2000" dirty="0" smtClean="0"/>
+              <a:t>.</a:t>
+            </a:r>
+          </a:p>
+          <a:p>
+            <a:pPr marL="0" indent="0">
+              <a:buNone/>
+            </a:pPr>
+            <a:endParaRPr lang="en-US" sz="2000" dirty="0"/>
           </a:p>
         </p:txBody>
       </p:sp>
+      <p:pic>
+        <p:nvPicPr>
+          <p:cNvPr id="4098" name="Picture 2"/>
+          <p:cNvPicPr>
+            <a:picLocks noChangeAspect="1" noChangeArrowheads="1"/>
+          </p:cNvPicPr>
+          <p:nvPr/>
+        </p:nvPicPr>
+        <p:blipFill>
+          <a:blip r:embed="rId2">
+            <a:extLst>
+              <a:ext uri="{28A0092B-C50C-407E-A947-70E740481C1C}">
+                <a14:useLocalDpi xmlns:a14="http://schemas.microsoft.com/office/drawing/2010/main" val="0"/>
+              </a:ext>
+            </a:extLst>
+          </a:blip>
+          <a:srcRect/>
+          <a:stretch>
+            <a:fillRect/>
+          </a:stretch>
+        </p:blipFill>
+        <p:spPr bwMode="auto">
+          <a:xfrm>
+            <a:off x="1066800" y="3429000"/>
+            <a:ext cx="7118968" cy="2057400"/>
+          </a:xfrm>
+          <a:prstGeom prst="rect">
+            <a:avLst/>
+          </a:prstGeom>
+          <a:noFill/>
+          <a:ln>
+            <a:noFill/>
+          </a:ln>
+          <a:effectLst/>
+          <a:extLst>
+            <a:ext uri="{909E8E84-426E-40DD-AFC4-6F175D3DCCD1}">
+              <a14:hiddenFill xmlns:a14="http://schemas.microsoft.com/office/drawing/2010/main">
+                <a:solidFill>
+                  <a:schemeClr val="accent1"/>
+                </a:solidFill>
+              </a14:hiddenFill>
+            </a:ext>
+            <a:ext uri="{91240B29-F687-4F45-9708-019B960494DF}">
+              <a14:hiddenLine xmlns:a14="http://schemas.microsoft.com/office/drawing/2010/main" w="9525">
+                <a:solidFill>
+                  <a:schemeClr val="tx1"/>
+                </a:solidFill>
+                <a:miter lim="800000"/>
+                <a:headEnd/>
+                <a:tailEnd/>
+              </a14:hiddenLine>
+            </a:ext>
+            <a:ext uri="{AF507438-7753-43E0-B8FC-AC1667EBCBE1}">
+              <a14:hiddenEffects xmlns:a14="http://schemas.microsoft.com/office/drawing/2010/main">
+                <a:effectLst>
+                  <a:outerShdw dist="35921" dir="2700000" algn="ctr" rotWithShape="0">
+                    <a:schemeClr val="bg2"/>
+                  </a:outerShdw>
+                </a:effectLst>
+              </a14:hiddenEffects>
+            </a:ext>
+          </a:extLst>
+        </p:spPr>
+      </p:pic>
     </p:spTree>
     <p:extLst>
       <p:ext uri="{BB962C8B-B14F-4D97-AF65-F5344CB8AC3E}">
@@ -11393,6 +13492,13 @@
   <p:clrMapOvr>
     <a:masterClrMapping/>
   </p:clrMapOvr>
+  <p:timing>
+    <p:tnLst>
+      <p:par>
+        <p:cTn id="1" dur="indefinite" restart="never" nodeType="tmRoot"/>
+      </p:par>
+    </p:tnLst>
+  </p:timing>
 </p:sld>
 </file>
 
@@ -11454,20 +13560,13 @@
     </p:spTree>
     <p:extLst>
       <p:ext uri="{BB962C8B-B14F-4D97-AF65-F5344CB8AC3E}">
-        <p14:creationId xmlns:p14="http://schemas.microsoft.com/office/powerpoint/2010/main" val="589827844"/>
+        <p14:creationId xmlns:p14="http://schemas.microsoft.com/office/powerpoint/2010/main" val="3830813703"/>
       </p:ext>
     </p:extLst>
   </p:cSld>
   <p:clrMapOvr>
     <a:masterClrMapping/>
   </p:clrMapOvr>
-  <p:timing>
-    <p:tnLst>
-      <p:par>
-        <p:cTn id="1" dur="indefinite" restart="never" nodeType="tmRoot"/>
-      </p:par>
-    </p:tnLst>
-  </p:timing>
 </p:sld>
 </file>
 
@@ -11529,7 +13628,7 @@
     </p:spTree>
     <p:extLst>
       <p:ext uri="{BB962C8B-B14F-4D97-AF65-F5344CB8AC3E}">
-        <p14:creationId xmlns:p14="http://schemas.microsoft.com/office/powerpoint/2010/main" val="3993647947"/>
+        <p14:creationId xmlns:p14="http://schemas.microsoft.com/office/powerpoint/2010/main" val="589827844"/>
       </p:ext>
     </p:extLst>
   </p:cSld>
@@ -11578,6 +13677,81 @@
           <a:bodyPr/>
           <a:lstStyle/>
           <a:p>
+            <a:endParaRPr lang="en-US"/>
+          </a:p>
+        </p:txBody>
+      </p:sp>
+      <p:sp>
+        <p:nvSpPr>
+          <p:cNvPr id="3" name="Content Placeholder 2"/>
+          <p:cNvSpPr>
+            <a:spLocks noGrp="1"/>
+          </p:cNvSpPr>
+          <p:nvPr>
+            <p:ph idx="1"/>
+          </p:nvPr>
+        </p:nvSpPr>
+        <p:spPr/>
+        <p:txBody>
+          <a:bodyPr/>
+          <a:lstStyle/>
+          <a:p>
+            <a:endParaRPr lang="en-US"/>
+          </a:p>
+        </p:txBody>
+      </p:sp>
+    </p:spTree>
+    <p:extLst>
+      <p:ext uri="{BB962C8B-B14F-4D97-AF65-F5344CB8AC3E}">
+        <p14:creationId xmlns:p14="http://schemas.microsoft.com/office/powerpoint/2010/main" val="3993647947"/>
+      </p:ext>
+    </p:extLst>
+  </p:cSld>
+  <p:clrMapOvr>
+    <a:masterClrMapping/>
+  </p:clrMapOvr>
+  <p:timing>
+    <p:tnLst>
+      <p:par>
+        <p:cTn id="1" dur="indefinite" restart="never" nodeType="tmRoot"/>
+      </p:par>
+    </p:tnLst>
+  </p:timing>
+</p:sld>
+</file>
+
+<file path=ppt/slides/slide26.xml><?xml version="1.0" encoding="utf-8"?>
+<p:sld xmlns:a="http://schemas.openxmlformats.org/drawingml/2006/main" xmlns:r="http://schemas.openxmlformats.org/officeDocument/2006/relationships" xmlns:p="http://schemas.openxmlformats.org/presentationml/2006/main">
+  <p:cSld>
+    <p:spTree>
+      <p:nvGrpSpPr>
+        <p:cNvPr id="1" name=""/>
+        <p:cNvGrpSpPr/>
+        <p:nvPr/>
+      </p:nvGrpSpPr>
+      <p:grpSpPr>
+        <a:xfrm>
+          <a:off x="0" y="0"/>
+          <a:ext cx="0" cy="0"/>
+          <a:chOff x="0" y="0"/>
+          <a:chExt cx="0" cy="0"/>
+        </a:xfrm>
+      </p:grpSpPr>
+      <p:sp>
+        <p:nvSpPr>
+          <p:cNvPr id="2" name="Title 1"/>
+          <p:cNvSpPr>
+            <a:spLocks noGrp="1"/>
+          </p:cNvSpPr>
+          <p:nvPr>
+            <p:ph type="title"/>
+          </p:nvPr>
+        </p:nvSpPr>
+        <p:spPr/>
+        <p:txBody>
+          <a:bodyPr/>
+          <a:lstStyle/>
+          <a:p>
             <a:pPr algn="l"/>
             <a:r>
               <a:rPr lang="en-US" dirty="0" err="1" smtClean="0"/>
@@ -11627,13 +13801,7 @@
               <a:rPr lang="en-US" sz="2000" dirty="0" smtClean="0">
                 <a:hlinkClick r:id="rId2"/>
               </a:rPr>
-              <a:t>https</a:t>
-            </a:r>
-            <a:r>
-              <a:rPr lang="en-US" sz="2000" dirty="0" smtClean="0">
-                <a:hlinkClick r:id="rId2"/>
-              </a:rPr>
-              <a:t>://www.pradha.id/read/install-python-3-di-windows-10</a:t>
+              <a:t>https://www.pradha.id/read/install-python-3-di-windows-10</a:t>
             </a:r>
             <a:endParaRPr lang="en-US" sz="2000" dirty="0" smtClean="0"/>
           </a:p>
@@ -11645,13 +13813,7 @@
               <a:rPr lang="en-US" sz="2000" dirty="0" smtClean="0">
                 <a:hlinkClick r:id="rId3"/>
               </a:rPr>
-              <a:t>https://www.petanikode.com/python-sintaks</a:t>
-            </a:r>
-            <a:r>
-              <a:rPr lang="en-US" sz="2000" dirty="0" smtClean="0">
-                <a:hlinkClick r:id="rId3"/>
-              </a:rPr>
-              <a:t>/</a:t>
+              <a:t>https://www.petanikode.com/python-sintaks/</a:t>
             </a:r>
             <a:endParaRPr lang="en-US" sz="2000" dirty="0" smtClean="0"/>
           </a:p>
@@ -11770,6 +13932,44 @@
             <a:pPr marL="0" indent="0">
               <a:buNone/>
             </a:pPr>
+            <a:r>
+              <a:rPr lang="en-US" sz="2000" dirty="0">
+                <a:hlinkClick r:id="rId10"/>
+              </a:rPr>
+              <a:t>https://</a:t>
+            </a:r>
+            <a:r>
+              <a:rPr lang="en-US" sz="2000" dirty="0" smtClean="0">
+                <a:hlinkClick r:id="rId10"/>
+              </a:rPr>
+              <a:t>belajarpython.com/tutorial/kondisi-if-else-python</a:t>
+            </a:r>
+            <a:r>
+              <a:rPr lang="en-US" sz="2000" dirty="0" smtClean="0"/>
+              <a:t> </a:t>
+            </a:r>
+            <a:endParaRPr lang="en-US" sz="2000" dirty="0" smtClean="0"/>
+          </a:p>
+          <a:p>
+            <a:pPr marL="0" indent="0">
+              <a:buNone/>
+            </a:pPr>
+            <a:r>
+              <a:rPr lang="en-US" sz="2000" dirty="0">
+                <a:hlinkClick r:id="rId11"/>
+              </a:rPr>
+              <a:t>https://www.petanikode.com/python-fungsi</a:t>
+            </a:r>
+            <a:r>
+              <a:rPr lang="en-US" sz="2000" dirty="0" smtClean="0">
+                <a:hlinkClick r:id="rId11"/>
+              </a:rPr>
+              <a:t>/</a:t>
+            </a:r>
+            <a:r>
+              <a:rPr lang="en-US" sz="2000" dirty="0" smtClean="0"/>
+              <a:t> </a:t>
+            </a:r>
             <a:endParaRPr lang="en-US" sz="2000" dirty="0" smtClean="0"/>
           </a:p>
           <a:p>
@@ -11945,11 +14145,7 @@
             </a:r>
             <a:r>
               <a:rPr lang="en-US" sz="2000" dirty="0" smtClean="0"/>
-              <a:t> </a:t>
-            </a:r>
-            <a:r>
-              <a:rPr lang="en-US" sz="2000" dirty="0" smtClean="0"/>
-              <a:t>Python </a:t>
+              <a:t> Python </a:t>
             </a:r>
             <a:r>
               <a:rPr lang="en-US" sz="2000" dirty="0" err="1" smtClean="0"/>
@@ -12050,11 +14246,7 @@
             </a:r>
             <a:r>
               <a:rPr lang="en-US" sz="2000" dirty="0" smtClean="0"/>
-              <a:t> </a:t>
-            </a:r>
-            <a:r>
-              <a:rPr lang="en-US" sz="2000" dirty="0" smtClean="0"/>
-              <a:t>Python </a:t>
+              <a:t> Python </a:t>
             </a:r>
             <a:r>
               <a:rPr lang="en-US" sz="2000" dirty="0" err="1" smtClean="0"/>
@@ -12118,19 +14310,11 @@
             </a:r>
             <a:r>
               <a:rPr lang="en-US" sz="2000" dirty="0"/>
-              <a:t> </a:t>
-            </a:r>
-            <a:r>
-              <a:rPr lang="en-US" sz="2000" dirty="0"/>
-              <a:t>P</a:t>
-            </a:r>
-            <a:r>
-              <a:rPr lang="en-US" sz="2000" dirty="0" smtClean="0"/>
-              <a:t>ython </a:t>
-            </a:r>
-            <a:r>
-              <a:rPr lang="en-US" sz="2000" dirty="0" smtClean="0"/>
-              <a:t>yang di </a:t>
+              <a:t> P</a:t>
+            </a:r>
+            <a:r>
+              <a:rPr lang="en-US" sz="2000" dirty="0" smtClean="0"/>
+              <a:t>ython yang di </a:t>
             </a:r>
             <a:r>
               <a:rPr lang="en-US" sz="2000" dirty="0" err="1" smtClean="0"/>
@@ -12195,15 +14379,7 @@
             </a:r>
             <a:r>
               <a:rPr lang="en-US" sz="2000" dirty="0" smtClean="0"/>
-              <a:t> </a:t>
-            </a:r>
-            <a:r>
-              <a:rPr lang="en-US" sz="2000" dirty="0" smtClean="0"/>
-              <a:t>Python </a:t>
-            </a:r>
-            <a:r>
-              <a:rPr lang="en-US" sz="2000" dirty="0" smtClean="0"/>
-              <a:t>yang </a:t>
+              <a:t> Python yang </a:t>
             </a:r>
             <a:r>
               <a:rPr lang="en-US" sz="2000" dirty="0" err="1" smtClean="0"/>

</xml_diff>